<commit_message>
Update slides Python course 4
</commit_message>
<xml_diff>
--- a/python_course/4_scikit_learn/python_cursus_4.pptx
+++ b/python_course/4_scikit_learn/python_cursus_4.pptx
@@ -22,7 +22,7 @@
     <p:sldId id="363" r:id="rId13"/>
     <p:sldId id="352" r:id="rId14"/>
     <p:sldId id="353" r:id="rId15"/>
-    <p:sldId id="354" r:id="rId16"/>
+    <p:sldId id="393" r:id="rId16"/>
     <p:sldId id="364" r:id="rId17"/>
     <p:sldId id="367" r:id="rId18"/>
     <p:sldId id="388" r:id="rId19"/>
@@ -240,7 +240,7 @@
               <a:cs typeface="+mn-cs"/>
             </a:defRPr>
           </a:pPr>
-          <a:endParaRPr lang="nl-NL"/>
+          <a:endParaRPr lang="en-NL"/>
         </a:p>
       </c:txPr>
     </c:title>
@@ -419,7 +419,7 @@
                 <a:cs typeface="+mn-cs"/>
               </a:defRPr>
             </a:pPr>
-            <a:endParaRPr lang="nl-NL"/>
+            <a:endParaRPr lang="en-NL"/>
           </a:p>
         </c:txPr>
         <c:crossAx val="817693096"/>
@@ -478,7 +478,7 @@
                 <a:cs typeface="+mn-cs"/>
               </a:defRPr>
             </a:pPr>
-            <a:endParaRPr lang="nl-NL"/>
+            <a:endParaRPr lang="en-NL"/>
           </a:p>
         </c:txPr>
         <c:crossAx val="817693456"/>
@@ -520,7 +520,7 @@
       <a:pPr>
         <a:defRPr/>
       </a:pPr>
-      <a:endParaRPr lang="nl-NL"/>
+      <a:endParaRPr lang="en-NL"/>
     </a:p>
   </c:txPr>
   <c:externalData r:id="rId3">
@@ -1154,7 +1154,7 @@
           <a:p>
             <a:fld id="{6F54D322-06CD-4C3F-9549-759BC5FDB94E}" type="datetimeFigureOut">
               <a:rPr lang="nl-NL" smtClean="0"/>
-              <a:t>10-10-2023</a:t>
+              <a:t>10-9-2024</a:t>
             </a:fld>
             <a:endParaRPr lang="nl-NL"/>
           </a:p>
@@ -1835,7 +1835,7 @@
           <a:p>
             <a:fld id="{5E9D55AD-DA6B-4A9D-BFE6-D0A1673E6EA9}" type="datetimeFigureOut">
               <a:rPr lang="en-NL" smtClean="0"/>
-              <a:t>10/10/2023</a:t>
+              <a:t>10/09/2024</a:t>
             </a:fld>
             <a:endParaRPr lang="en-NL"/>
           </a:p>
@@ -2035,7 +2035,7 @@
           <a:p>
             <a:fld id="{5E9D55AD-DA6B-4A9D-BFE6-D0A1673E6EA9}" type="datetimeFigureOut">
               <a:rPr lang="en-NL" smtClean="0"/>
-              <a:t>10/10/2023</a:t>
+              <a:t>10/09/2024</a:t>
             </a:fld>
             <a:endParaRPr lang="en-NL"/>
           </a:p>
@@ -2245,7 +2245,7 @@
           <a:p>
             <a:fld id="{5E9D55AD-DA6B-4A9D-BFE6-D0A1673E6EA9}" type="datetimeFigureOut">
               <a:rPr lang="en-NL" smtClean="0"/>
-              <a:t>10/10/2023</a:t>
+              <a:t>10/09/2024</a:t>
             </a:fld>
             <a:endParaRPr lang="en-NL"/>
           </a:p>
@@ -2445,7 +2445,7 @@
           <a:p>
             <a:fld id="{5E9D55AD-DA6B-4A9D-BFE6-D0A1673E6EA9}" type="datetimeFigureOut">
               <a:rPr lang="en-NL" smtClean="0"/>
-              <a:t>10/10/2023</a:t>
+              <a:t>10/09/2024</a:t>
             </a:fld>
             <a:endParaRPr lang="en-NL"/>
           </a:p>
@@ -2721,7 +2721,7 @@
           <a:p>
             <a:fld id="{5E9D55AD-DA6B-4A9D-BFE6-D0A1673E6EA9}" type="datetimeFigureOut">
               <a:rPr lang="en-NL" smtClean="0"/>
-              <a:t>10/10/2023</a:t>
+              <a:t>10/09/2024</a:t>
             </a:fld>
             <a:endParaRPr lang="en-NL"/>
           </a:p>
@@ -2989,7 +2989,7 @@
           <a:p>
             <a:fld id="{5E9D55AD-DA6B-4A9D-BFE6-D0A1673E6EA9}" type="datetimeFigureOut">
               <a:rPr lang="en-NL" smtClean="0"/>
-              <a:t>10/10/2023</a:t>
+              <a:t>10/09/2024</a:t>
             </a:fld>
             <a:endParaRPr lang="en-NL"/>
           </a:p>
@@ -3404,7 +3404,7 @@
           <a:p>
             <a:fld id="{5E9D55AD-DA6B-4A9D-BFE6-D0A1673E6EA9}" type="datetimeFigureOut">
               <a:rPr lang="en-NL" smtClean="0"/>
-              <a:t>10/10/2023</a:t>
+              <a:t>10/09/2024</a:t>
             </a:fld>
             <a:endParaRPr lang="en-NL"/>
           </a:p>
@@ -3546,7 +3546,7 @@
           <a:p>
             <a:fld id="{5E9D55AD-DA6B-4A9D-BFE6-D0A1673E6EA9}" type="datetimeFigureOut">
               <a:rPr lang="en-NL" smtClean="0"/>
-              <a:t>10/10/2023</a:t>
+              <a:t>10/09/2024</a:t>
             </a:fld>
             <a:endParaRPr lang="en-NL"/>
           </a:p>
@@ -3659,7 +3659,7 @@
           <a:p>
             <a:fld id="{5E9D55AD-DA6B-4A9D-BFE6-D0A1673E6EA9}" type="datetimeFigureOut">
               <a:rPr lang="en-NL" smtClean="0"/>
-              <a:t>10/10/2023</a:t>
+              <a:t>10/09/2024</a:t>
             </a:fld>
             <a:endParaRPr lang="en-NL"/>
           </a:p>
@@ -3972,7 +3972,7 @@
           <a:p>
             <a:fld id="{5E9D55AD-DA6B-4A9D-BFE6-D0A1673E6EA9}" type="datetimeFigureOut">
               <a:rPr lang="en-NL" smtClean="0"/>
-              <a:t>10/10/2023</a:t>
+              <a:t>10/09/2024</a:t>
             </a:fld>
             <a:endParaRPr lang="en-NL"/>
           </a:p>
@@ -4261,7 +4261,7 @@
           <a:p>
             <a:fld id="{5E9D55AD-DA6B-4A9D-BFE6-D0A1673E6EA9}" type="datetimeFigureOut">
               <a:rPr lang="en-NL" smtClean="0"/>
-              <a:t>10/10/2023</a:t>
+              <a:t>10/09/2024</a:t>
             </a:fld>
             <a:endParaRPr lang="en-NL"/>
           </a:p>
@@ -4504,7 +4504,7 @@
           <a:p>
             <a:fld id="{5E9D55AD-DA6B-4A9D-BFE6-D0A1673E6EA9}" type="datetimeFigureOut">
               <a:rPr lang="en-NL" smtClean="0"/>
-              <a:t>10/10/2023</a:t>
+              <a:t>10/09/2024</a:t>
             </a:fld>
             <a:endParaRPr lang="en-NL"/>
           </a:p>
@@ -5717,7 +5717,7 @@
             </a:pPr>
             <a:r>
               <a:rPr lang="nl-NL" sz="2000" dirty="0"/>
-              <a:t>Problemen in de data oplossen voor het gekozen model.</a:t>
+              <a:t>Problemen met de data oplossen voor het gekozen model.</a:t>
             </a:r>
           </a:p>
           <a:p>
@@ -6072,64 +6072,72 @@
             </a:lvl9pPr>
           </a:lstStyle>
           <a:p>
-            <a:pPr marL="0" indent="0">
+            <a:pPr marL="0" indent="0" algn="ctr">
               <a:buNone/>
             </a:pPr>
             <a:r>
               <a:rPr lang="nl-NL" sz="2000" dirty="0"/>
-              <a:t>Afhankelijk van kennis / keuzes:</a:t>
-            </a:r>
-          </a:p>
-          <a:p>
-            <a:pPr marL="0" indent="0">
+              <a:t>Afhankelijk van </a:t>
+            </a:r>
+            <a:r>
+              <a:rPr lang="nl-NL" sz="2000" b="1" dirty="0"/>
+              <a:t>expertise</a:t>
+            </a:r>
+            <a:r>
+              <a:rPr lang="nl-NL" sz="2000" dirty="0"/>
+              <a:t>:</a:t>
+            </a:r>
+          </a:p>
+          <a:p>
+            <a:pPr marL="0" indent="0" algn="ctr">
               <a:buNone/>
             </a:pPr>
             <a:endParaRPr lang="nl-NL" sz="2000" dirty="0"/>
           </a:p>
           <a:p>
-            <a:pPr marL="0" indent="0">
+            <a:pPr marL="0" indent="0" algn="ctr">
               <a:buNone/>
             </a:pPr>
             <a:endParaRPr lang="nl-NL" sz="2000" dirty="0"/>
           </a:p>
           <a:p>
-            <a:pPr marL="0" indent="0">
+            <a:pPr marL="0" indent="0" algn="ctr">
               <a:buNone/>
             </a:pPr>
             <a:endParaRPr lang="nl-NL" sz="2000" dirty="0"/>
           </a:p>
           <a:p>
-            <a:pPr marL="0" indent="0">
+            <a:pPr marL="0" indent="0" algn="ctr">
               <a:buNone/>
             </a:pPr>
             <a:endParaRPr lang="nl-NL" sz="2000" dirty="0"/>
           </a:p>
           <a:p>
-            <a:pPr marL="0" indent="0">
+            <a:pPr marL="0" indent="0" algn="ctr">
               <a:buNone/>
             </a:pPr>
             <a:endParaRPr lang="nl-NL" sz="2000" dirty="0"/>
           </a:p>
           <a:p>
-            <a:pPr marL="0" indent="0">
+            <a:pPr marL="0" indent="0" algn="ctr">
               <a:buNone/>
             </a:pPr>
             <a:endParaRPr lang="nl-NL" sz="2000" dirty="0"/>
           </a:p>
           <a:p>
-            <a:pPr marL="0" indent="0">
+            <a:pPr marL="0" indent="0" algn="ctr">
               <a:buNone/>
             </a:pPr>
             <a:endParaRPr lang="nl-NL" sz="2000" dirty="0"/>
           </a:p>
           <a:p>
-            <a:pPr marL="0" indent="0">
+            <a:pPr marL="0" indent="0" algn="ctr">
               <a:buNone/>
             </a:pPr>
             <a:endParaRPr lang="nl-NL" sz="2000" dirty="0"/>
           </a:p>
           <a:p>
-            <a:pPr marL="0" indent="0">
+            <a:pPr marL="0" indent="0" algn="ctr">
               <a:buNone/>
             </a:pPr>
             <a:endParaRPr lang="nl-NL" sz="2000" dirty="0"/>
@@ -6140,11 +6148,11 @@
             </a:pPr>
             <a:r>
               <a:rPr lang="nl-NL" sz="2000" b="1" dirty="0"/>
-              <a:t>Onderdeel van data preparatie.</a:t>
-            </a:r>
-          </a:p>
-          <a:p>
-            <a:pPr marL="0" indent="0">
+              <a:t>Onderdeel van preparatie.</a:t>
+            </a:r>
+          </a:p>
+          <a:p>
+            <a:pPr marL="0" indent="0" algn="ctr">
               <a:buNone/>
             </a:pPr>
             <a:endParaRPr lang="nl-NL" sz="2000" dirty="0"/>
@@ -6190,38 +6198,6 @@
       </p:sp>
       <p:sp>
         <p:nvSpPr>
-          <p:cNvPr id="4" name="TextBox 3">
-            <a:extLst>
-              <a:ext uri="{FF2B5EF4-FFF2-40B4-BE49-F238E27FC236}">
-                <a16:creationId xmlns:a16="http://schemas.microsoft.com/office/drawing/2014/main" id="{B47EA95A-6DDD-ED89-357A-943A5BC87A94}"/>
-              </a:ext>
-            </a:extLst>
-          </p:cNvPr>
-          <p:cNvSpPr txBox="1"/>
-          <p:nvPr/>
-        </p:nvSpPr>
-        <p:spPr>
-          <a:xfrm>
-            <a:off x="6555232" y="2530561"/>
-            <a:ext cx="184731" cy="369332"/>
-          </a:xfrm>
-          <a:prstGeom prst="rect">
-            <a:avLst/>
-          </a:prstGeom>
-          <a:noFill/>
-        </p:spPr>
-        <p:txBody>
-          <a:bodyPr wrap="none" rtlCol="0">
-            <a:spAutoFit/>
-          </a:bodyPr>
-          <a:lstStyle/>
-          <a:p>
-            <a:endParaRPr lang="en-NL" dirty="0"/>
-          </a:p>
-        </p:txBody>
-      </p:sp>
-      <p:sp>
-        <p:nvSpPr>
           <p:cNvPr id="8" name="Content Placeholder 2">
             <a:extLst>
               <a:ext uri="{FF2B5EF4-FFF2-40B4-BE49-F238E27FC236}">
@@ -6236,8 +6212,8 @@
         </p:nvSpPr>
         <p:spPr>
           <a:xfrm>
-            <a:off x="6487238" y="1608667"/>
-            <a:ext cx="5099367" cy="4720696"/>
+            <a:off x="6487239" y="1608667"/>
+            <a:ext cx="4682268" cy="4720696"/>
           </a:xfrm>
           <a:prstGeom prst="rect">
             <a:avLst/>
@@ -6412,18 +6388,30 @@
             </a:lvl9pPr>
           </a:lstStyle>
           <a:p>
-            <a:pPr marL="0" indent="0">
+            <a:pPr marL="0" indent="0" algn="ctr">
               <a:buNone/>
             </a:pPr>
             <a:r>
               <a:rPr lang="nl-NL" sz="2000" dirty="0">
                 <a:cs typeface="Courier New" panose="02070309020205020404" pitchFamily="49" charset="0"/>
               </a:rPr>
-              <a:t>Afhankelijk van data / steekproef:</a:t>
-            </a:r>
-          </a:p>
-          <a:p>
-            <a:pPr marL="0" indent="0">
+              <a:t>Afhankelijk van de </a:t>
+            </a:r>
+            <a:r>
+              <a:rPr lang="nl-NL" sz="2000" b="1" dirty="0">
+                <a:cs typeface="Courier New" panose="02070309020205020404" pitchFamily="49" charset="0"/>
+              </a:rPr>
+              <a:t>data</a:t>
+            </a:r>
+            <a:r>
+              <a:rPr lang="nl-NL" sz="2000" dirty="0">
+                <a:cs typeface="Courier New" panose="02070309020205020404" pitchFamily="49" charset="0"/>
+              </a:rPr>
+              <a:t>:</a:t>
+            </a:r>
+          </a:p>
+          <a:p>
+            <a:pPr marL="0" indent="0" algn="ctr">
               <a:buNone/>
             </a:pPr>
             <a:endParaRPr lang="nl-NL" sz="2000" dirty="0">
@@ -6431,7 +6419,7 @@
             </a:endParaRPr>
           </a:p>
           <a:p>
-            <a:pPr marL="0" indent="0">
+            <a:pPr marL="0" indent="0" algn="ctr">
               <a:buNone/>
             </a:pPr>
             <a:endParaRPr lang="nl-NL" sz="2000" dirty="0">
@@ -6439,7 +6427,7 @@
             </a:endParaRPr>
           </a:p>
           <a:p>
-            <a:pPr marL="0" indent="0">
+            <a:pPr marL="0" indent="0" algn="ctr">
               <a:buNone/>
             </a:pPr>
             <a:endParaRPr lang="nl-NL" sz="2000" dirty="0">
@@ -6447,7 +6435,7 @@
             </a:endParaRPr>
           </a:p>
           <a:p>
-            <a:pPr marL="0" indent="0">
+            <a:pPr marL="0" indent="0" algn="ctr">
               <a:buNone/>
             </a:pPr>
             <a:endParaRPr lang="nl-NL" sz="2000" dirty="0">
@@ -6455,7 +6443,7 @@
             </a:endParaRPr>
           </a:p>
           <a:p>
-            <a:pPr marL="0" indent="0">
+            <a:pPr marL="0" indent="0" algn="ctr">
               <a:buNone/>
             </a:pPr>
             <a:endParaRPr lang="nl-NL" sz="2000" dirty="0">
@@ -6463,7 +6451,7 @@
             </a:endParaRPr>
           </a:p>
           <a:p>
-            <a:pPr marL="0" indent="0">
+            <a:pPr marL="0" indent="0" algn="ctr">
               <a:buNone/>
             </a:pPr>
             <a:endParaRPr lang="nl-NL" sz="2000" dirty="0">
@@ -6471,7 +6459,7 @@
             </a:endParaRPr>
           </a:p>
           <a:p>
-            <a:pPr marL="0" indent="0">
+            <a:pPr marL="0" indent="0" algn="ctr">
               <a:buNone/>
             </a:pPr>
             <a:endParaRPr lang="nl-NL" sz="2000" dirty="0">
@@ -6479,7 +6467,7 @@
             </a:endParaRPr>
           </a:p>
           <a:p>
-            <a:pPr marL="0" indent="0">
+            <a:pPr marL="0" indent="0" algn="ctr">
               <a:buNone/>
             </a:pPr>
             <a:endParaRPr lang="nl-NL" sz="2000" dirty="0">
@@ -6487,7 +6475,7 @@
             </a:endParaRPr>
           </a:p>
           <a:p>
-            <a:pPr marL="0" indent="0">
+            <a:pPr marL="0" indent="0" algn="ctr">
               <a:buNone/>
             </a:pPr>
             <a:endParaRPr lang="nl-NL" sz="2000" dirty="0">
@@ -6506,7 +6494,7 @@
             </a:r>
           </a:p>
           <a:p>
-            <a:pPr marL="0" indent="0">
+            <a:pPr marL="0" indent="0" algn="ctr">
               <a:buNone/>
             </a:pPr>
             <a:endParaRPr lang="nl-NL" sz="2000" dirty="0">
@@ -6514,7 +6502,7 @@
             </a:endParaRPr>
           </a:p>
           <a:p>
-            <a:pPr marL="0" indent="0">
+            <a:pPr marL="0" indent="0" algn="ctr">
               <a:buNone/>
             </a:pPr>
             <a:endParaRPr lang="nl-NL" sz="2000" dirty="0">
@@ -6670,1006 +6658,585 @@
           </a:p>
         </p:txBody>
       </p:sp>
-      <p:sp>
-        <p:nvSpPr>
-          <p:cNvPr id="7" name="Rectangle 6">
-            <a:extLst>
-              <a:ext uri="{FF2B5EF4-FFF2-40B4-BE49-F238E27FC236}">
-                <a16:creationId xmlns:a16="http://schemas.microsoft.com/office/drawing/2014/main" id="{F00DB929-11BC-15D1-0CBD-8CD4933EDA27}"/>
-              </a:ext>
-            </a:extLst>
-          </p:cNvPr>
-          <p:cNvSpPr/>
+      <p:grpSp>
+        <p:nvGrpSpPr>
+          <p:cNvPr id="46" name="Group 45">
+            <a:extLst>
+              <a:ext uri="{FF2B5EF4-FFF2-40B4-BE49-F238E27FC236}">
+                <a16:creationId xmlns:a16="http://schemas.microsoft.com/office/drawing/2014/main" id="{74EC4FCD-054F-6996-771E-BA2F8BEB65B6}"/>
+              </a:ext>
+            </a:extLst>
+          </p:cNvPr>
+          <p:cNvGrpSpPr/>
           <p:nvPr/>
-        </p:nvSpPr>
-        <p:spPr>
+        </p:nvGrpSpPr>
+        <p:grpSpPr>
           <a:xfrm>
-            <a:off x="990600" y="2564424"/>
-            <a:ext cx="842405" cy="689211"/>
+            <a:off x="6625781" y="2627998"/>
+            <a:ext cx="4229273" cy="1767301"/>
+            <a:chOff x="6625781" y="2627998"/>
+            <a:chExt cx="4229273" cy="1767301"/>
           </a:xfrm>
-          <a:prstGeom prst="rect">
-            <a:avLst/>
-          </a:prstGeom>
-        </p:spPr>
-        <p:style>
-          <a:lnRef idx="1">
-            <a:schemeClr val="accent4"/>
-          </a:lnRef>
-          <a:fillRef idx="2">
-            <a:schemeClr val="accent4"/>
-          </a:fillRef>
-          <a:effectRef idx="1">
-            <a:schemeClr val="accent4"/>
-          </a:effectRef>
-          <a:fontRef idx="minor">
-            <a:schemeClr val="dk1"/>
-          </a:fontRef>
-        </p:style>
-        <p:txBody>
-          <a:bodyPr rtlCol="0" anchor="ctr"/>
-          <a:lstStyle/>
-          <a:p>
-            <a:pPr algn="ctr"/>
-            <a:r>
-              <a:rPr lang="en-US" dirty="0"/>
-              <a:t>A</a:t>
-            </a:r>
-            <a:endParaRPr lang="en-NL" dirty="0"/>
-          </a:p>
-        </p:txBody>
-      </p:sp>
-      <p:sp>
-        <p:nvSpPr>
-          <p:cNvPr id="10" name="Rectangle 9">
-            <a:extLst>
-              <a:ext uri="{FF2B5EF4-FFF2-40B4-BE49-F238E27FC236}">
-                <a16:creationId xmlns:a16="http://schemas.microsoft.com/office/drawing/2014/main" id="{7D6D7D9B-AE9D-083C-A08C-F899249FEA54}"/>
-              </a:ext>
-            </a:extLst>
-          </p:cNvPr>
-          <p:cNvSpPr/>
+        </p:grpSpPr>
+        <p:sp>
+          <p:nvSpPr>
+            <p:cNvPr id="4" name="TextBox 3">
+              <a:extLst>
+                <a:ext uri="{FF2B5EF4-FFF2-40B4-BE49-F238E27FC236}">
+                  <a16:creationId xmlns:a16="http://schemas.microsoft.com/office/drawing/2014/main" id="{B47EA95A-6DDD-ED89-357A-943A5BC87A94}"/>
+                </a:ext>
+              </a:extLst>
+            </p:cNvPr>
+            <p:cNvSpPr txBox="1"/>
+            <p:nvPr/>
+          </p:nvSpPr>
+          <p:spPr>
+            <a:xfrm>
+              <a:off x="6693776" y="3671968"/>
+              <a:ext cx="184731" cy="369332"/>
+            </a:xfrm>
+            <a:prstGeom prst="rect">
+              <a:avLst/>
+            </a:prstGeom>
+            <a:noFill/>
+          </p:spPr>
+          <p:txBody>
+            <a:bodyPr wrap="none" rtlCol="0">
+              <a:spAutoFit/>
+            </a:bodyPr>
+            <a:lstStyle/>
+            <a:p>
+              <a:endParaRPr lang="en-NL" dirty="0"/>
+            </a:p>
+          </p:txBody>
+        </p:sp>
+        <p:sp>
+          <p:nvSpPr>
+            <p:cNvPr id="43" name="TextBox 42">
+              <a:extLst>
+                <a:ext uri="{FF2B5EF4-FFF2-40B4-BE49-F238E27FC236}">
+                  <a16:creationId xmlns:a16="http://schemas.microsoft.com/office/drawing/2014/main" id="{1E0F6E3C-3A1B-A60C-F359-7225143B1964}"/>
+                </a:ext>
+              </a:extLst>
+            </p:cNvPr>
+            <p:cNvSpPr txBox="1"/>
+            <p:nvPr/>
+          </p:nvSpPr>
+          <p:spPr>
+            <a:xfrm>
+              <a:off x="7046983" y="2627998"/>
+              <a:ext cx="1693432" cy="369332"/>
+            </a:xfrm>
+            <a:prstGeom prst="rect">
+              <a:avLst/>
+            </a:prstGeom>
+            <a:noFill/>
+          </p:spPr>
+          <p:txBody>
+            <a:bodyPr wrap="square" rtlCol="0">
+              <a:spAutoFit/>
+            </a:bodyPr>
+            <a:lstStyle/>
+            <a:p>
+              <a:pPr algn="ctr"/>
+              <a:r>
+                <a:rPr lang="en-US" dirty="0"/>
+                <a:t>mean=3.5</a:t>
+              </a:r>
+              <a:endParaRPr lang="en-NL" dirty="0"/>
+            </a:p>
+          </p:txBody>
+        </p:sp>
+        <p:sp>
+          <p:nvSpPr>
+            <p:cNvPr id="62" name="Rectangle 61">
+              <a:extLst>
+                <a:ext uri="{FF2B5EF4-FFF2-40B4-BE49-F238E27FC236}">
+                  <a16:creationId xmlns:a16="http://schemas.microsoft.com/office/drawing/2014/main" id="{6D2E12B5-F590-C0FB-BDF1-66A140ADD549}"/>
+                </a:ext>
+              </a:extLst>
+            </p:cNvPr>
+            <p:cNvSpPr/>
+            <p:nvPr/>
+          </p:nvSpPr>
+          <p:spPr>
+            <a:xfrm>
+              <a:off x="6625781" y="3706088"/>
+              <a:ext cx="842405" cy="689211"/>
+            </a:xfrm>
+            <a:prstGeom prst="rect">
+              <a:avLst/>
+            </a:prstGeom>
+          </p:spPr>
+          <p:style>
+            <a:lnRef idx="1">
+              <a:schemeClr val="accent4"/>
+            </a:lnRef>
+            <a:fillRef idx="2">
+              <a:schemeClr val="accent4"/>
+            </a:fillRef>
+            <a:effectRef idx="1">
+              <a:schemeClr val="accent4"/>
+            </a:effectRef>
+            <a:fontRef idx="minor">
+              <a:schemeClr val="dk1"/>
+            </a:fontRef>
+          </p:style>
+          <p:txBody>
+            <a:bodyPr rtlCol="0" anchor="ctr"/>
+            <a:lstStyle/>
+            <a:p>
+              <a:pPr algn="ctr"/>
+              <a:r>
+                <a:rPr lang="en-US" dirty="0"/>
+                <a:t>Train</a:t>
+              </a:r>
+              <a:endParaRPr lang="en-NL" dirty="0"/>
+            </a:p>
+          </p:txBody>
+        </p:sp>
+        <p:sp>
+          <p:nvSpPr>
+            <p:cNvPr id="64" name="Rectangle 63">
+              <a:extLst>
+                <a:ext uri="{FF2B5EF4-FFF2-40B4-BE49-F238E27FC236}">
+                  <a16:creationId xmlns:a16="http://schemas.microsoft.com/office/drawing/2014/main" id="{70737AA2-EA09-9E2D-5DE8-9357BE7015C4}"/>
+                </a:ext>
+              </a:extLst>
+            </p:cNvPr>
+            <p:cNvSpPr/>
+            <p:nvPr/>
+          </p:nvSpPr>
+          <p:spPr>
+            <a:xfrm>
+              <a:off x="10012649" y="3706088"/>
+              <a:ext cx="842405" cy="689211"/>
+            </a:xfrm>
+            <a:prstGeom prst="rect">
+              <a:avLst/>
+            </a:prstGeom>
+          </p:spPr>
+          <p:style>
+            <a:lnRef idx="1">
+              <a:schemeClr val="accent6"/>
+            </a:lnRef>
+            <a:fillRef idx="2">
+              <a:schemeClr val="accent6"/>
+            </a:fillRef>
+            <a:effectRef idx="1">
+              <a:schemeClr val="accent6"/>
+            </a:effectRef>
+            <a:fontRef idx="minor">
+              <a:schemeClr val="dk1"/>
+            </a:fontRef>
+          </p:style>
+          <p:txBody>
+            <a:bodyPr rtlCol="0" anchor="ctr"/>
+            <a:lstStyle/>
+            <a:p>
+              <a:pPr algn="ctr"/>
+              <a:r>
+                <a:rPr lang="en-US" dirty="0"/>
+                <a:t>Score</a:t>
+              </a:r>
+              <a:endParaRPr lang="en-NL" dirty="0"/>
+            </a:p>
+          </p:txBody>
+        </p:sp>
+        <p:sp>
+          <p:nvSpPr>
+            <p:cNvPr id="69" name="Rectangle: Rounded Corners 68">
+              <a:extLst>
+                <a:ext uri="{FF2B5EF4-FFF2-40B4-BE49-F238E27FC236}">
+                  <a16:creationId xmlns:a16="http://schemas.microsoft.com/office/drawing/2014/main" id="{B80D4A1A-7677-F3A5-E30E-9F185FE42C41}"/>
+                </a:ext>
+              </a:extLst>
+            </p:cNvPr>
+            <p:cNvSpPr/>
+            <p:nvPr/>
+          </p:nvSpPr>
+          <p:spPr>
+            <a:xfrm>
+              <a:off x="7994730" y="3706088"/>
+              <a:ext cx="1491370" cy="689211"/>
+            </a:xfrm>
+            <a:prstGeom prst="roundRect">
+              <a:avLst/>
+            </a:prstGeom>
+          </p:spPr>
+          <p:style>
+            <a:lnRef idx="1">
+              <a:schemeClr val="accent5"/>
+            </a:lnRef>
+            <a:fillRef idx="2">
+              <a:schemeClr val="accent5"/>
+            </a:fillRef>
+            <a:effectRef idx="1">
+              <a:schemeClr val="accent5"/>
+            </a:effectRef>
+            <a:fontRef idx="minor">
+              <a:schemeClr val="dk1"/>
+            </a:fontRef>
+          </p:style>
+          <p:txBody>
+            <a:bodyPr rtlCol="0" anchor="ctr"/>
+            <a:lstStyle/>
+            <a:p>
+              <a:pPr algn="ctr"/>
+              <a:r>
+                <a:rPr lang="en-US" dirty="0" err="1"/>
+                <a:t>fillna</a:t>
+              </a:r>
+              <a:r>
+                <a:rPr lang="en-US" dirty="0"/>
+                <a:t>(</a:t>
+              </a:r>
+              <a:r>
+                <a:rPr lang="en-US" b="1" dirty="0"/>
+                <a:t>mean</a:t>
+              </a:r>
+              <a:r>
+                <a:rPr lang="en-US" dirty="0"/>
+                <a:t>)</a:t>
+              </a:r>
+              <a:endParaRPr lang="en-NL" dirty="0"/>
+            </a:p>
+          </p:txBody>
+        </p:sp>
+        <p:cxnSp>
+          <p:nvCxnSpPr>
+            <p:cNvPr id="71" name="Straight Arrow Connector 70">
+              <a:extLst>
+                <a:ext uri="{FF2B5EF4-FFF2-40B4-BE49-F238E27FC236}">
+                  <a16:creationId xmlns:a16="http://schemas.microsoft.com/office/drawing/2014/main" id="{23FFCC05-02CC-447A-2940-213DCC0B906D}"/>
+                </a:ext>
+              </a:extLst>
+            </p:cNvPr>
+            <p:cNvCxnSpPr>
+              <a:cxnSpLocks/>
+              <a:stCxn id="69" idx="3"/>
+              <a:endCxn id="64" idx="1"/>
+            </p:cNvCxnSpPr>
+            <p:nvPr/>
+          </p:nvCxnSpPr>
+          <p:spPr>
+            <a:xfrm>
+              <a:off x="9486100" y="4050694"/>
+              <a:ext cx="526549" cy="0"/>
+            </a:xfrm>
+            <a:prstGeom prst="straightConnector1">
+              <a:avLst/>
+            </a:prstGeom>
+            <a:ln>
+              <a:tailEnd type="triangle"/>
+            </a:ln>
+          </p:spPr>
+          <p:style>
+            <a:lnRef idx="3">
+              <a:schemeClr val="dk1"/>
+            </a:lnRef>
+            <a:fillRef idx="0">
+              <a:schemeClr val="dk1"/>
+            </a:fillRef>
+            <a:effectRef idx="2">
+              <a:schemeClr val="dk1"/>
+            </a:effectRef>
+            <a:fontRef idx="minor">
+              <a:schemeClr val="tx1"/>
+            </a:fontRef>
+          </p:style>
+        </p:cxnSp>
+        <p:cxnSp>
+          <p:nvCxnSpPr>
+            <p:cNvPr id="26" name="Connector: Curved 25">
+              <a:extLst>
+                <a:ext uri="{FF2B5EF4-FFF2-40B4-BE49-F238E27FC236}">
+                  <a16:creationId xmlns:a16="http://schemas.microsoft.com/office/drawing/2014/main" id="{D778F3E4-1894-4DEB-B587-1EE55433F25D}"/>
+                </a:ext>
+              </a:extLst>
+            </p:cNvPr>
+            <p:cNvCxnSpPr>
+              <a:stCxn id="62" idx="0"/>
+              <a:endCxn id="69" idx="0"/>
+            </p:cNvCxnSpPr>
+            <p:nvPr/>
+          </p:nvCxnSpPr>
+          <p:spPr>
+            <a:xfrm rot="5400000" flipH="1" flipV="1">
+              <a:off x="7893699" y="2859373"/>
+              <a:ext cx="12700" cy="1693431"/>
+            </a:xfrm>
+            <a:prstGeom prst="curvedConnector3">
+              <a:avLst>
+                <a:gd name="adj1" fmla="val 4490913"/>
+              </a:avLst>
+            </a:prstGeom>
+            <a:ln>
+              <a:tailEnd type="triangle"/>
+            </a:ln>
+          </p:spPr>
+          <p:style>
+            <a:lnRef idx="3">
+              <a:schemeClr val="dk1"/>
+            </a:lnRef>
+            <a:fillRef idx="0">
+              <a:schemeClr val="dk1"/>
+            </a:fillRef>
+            <a:effectRef idx="2">
+              <a:schemeClr val="dk1"/>
+            </a:effectRef>
+            <a:fontRef idx="minor">
+              <a:schemeClr val="tx1"/>
+            </a:fontRef>
+          </p:style>
+        </p:cxnSp>
+      </p:grpSp>
+      <p:grpSp>
+        <p:nvGrpSpPr>
+          <p:cNvPr id="50" name="Group 49">
+            <a:extLst>
+              <a:ext uri="{FF2B5EF4-FFF2-40B4-BE49-F238E27FC236}">
+                <a16:creationId xmlns:a16="http://schemas.microsoft.com/office/drawing/2014/main" id="{FA18D7ED-6DAB-E471-E167-FF3D0E09BB7C}"/>
+              </a:ext>
+            </a:extLst>
+          </p:cNvPr>
+          <p:cNvGrpSpPr/>
           <p:nvPr/>
-        </p:nvSpPr>
-        <p:spPr>
+        </p:nvGrpSpPr>
+        <p:grpSpPr>
           <a:xfrm>
-            <a:off x="990599" y="4091847"/>
-            <a:ext cx="842405" cy="689211"/>
+            <a:off x="1022493" y="3584100"/>
+            <a:ext cx="4192511" cy="914400"/>
+            <a:chOff x="1022493" y="3584100"/>
+            <a:chExt cx="4192511" cy="914400"/>
           </a:xfrm>
-          <a:prstGeom prst="rect">
-            <a:avLst/>
-          </a:prstGeom>
-        </p:spPr>
-        <p:style>
-          <a:lnRef idx="1">
-            <a:schemeClr val="accent4"/>
-          </a:lnRef>
-          <a:fillRef idx="2">
-            <a:schemeClr val="accent4"/>
-          </a:fillRef>
-          <a:effectRef idx="1">
-            <a:schemeClr val="accent4"/>
-          </a:effectRef>
-          <a:fontRef idx="minor">
-            <a:schemeClr val="dk1"/>
-          </a:fontRef>
-        </p:style>
-        <p:txBody>
-          <a:bodyPr rtlCol="0" anchor="ctr"/>
-          <a:lstStyle/>
-          <a:p>
-            <a:pPr algn="ctr"/>
-            <a:r>
-              <a:rPr lang="en-US" dirty="0"/>
-              <a:t>B</a:t>
-            </a:r>
-            <a:endParaRPr lang="en-NL" dirty="0"/>
-          </a:p>
-        </p:txBody>
-      </p:sp>
-      <p:sp>
-        <p:nvSpPr>
-          <p:cNvPr id="14" name="Rectangle 13">
-            <a:extLst>
-              <a:ext uri="{FF2B5EF4-FFF2-40B4-BE49-F238E27FC236}">
-                <a16:creationId xmlns:a16="http://schemas.microsoft.com/office/drawing/2014/main" id="{CEE4A8F5-EECE-9EB4-1AAF-C709B49710D8}"/>
-              </a:ext>
-            </a:extLst>
-          </p:cNvPr>
-          <p:cNvSpPr/>
-          <p:nvPr/>
-        </p:nvSpPr>
-        <p:spPr>
-          <a:xfrm>
-            <a:off x="4377468" y="2564424"/>
-            <a:ext cx="842405" cy="689211"/>
-          </a:xfrm>
-          <a:prstGeom prst="rect">
-            <a:avLst/>
-          </a:prstGeom>
-        </p:spPr>
-        <p:style>
-          <a:lnRef idx="1">
-            <a:schemeClr val="accent6"/>
-          </a:lnRef>
-          <a:fillRef idx="2">
-            <a:schemeClr val="accent6"/>
-          </a:fillRef>
-          <a:effectRef idx="1">
-            <a:schemeClr val="accent6"/>
-          </a:effectRef>
-          <a:fontRef idx="minor">
-            <a:schemeClr val="dk1"/>
-          </a:fontRef>
-        </p:style>
-        <p:txBody>
-          <a:bodyPr rtlCol="0" anchor="ctr"/>
-          <a:lstStyle/>
-          <a:p>
-            <a:pPr algn="ctr"/>
-            <a:r>
-              <a:rPr lang="en-US" dirty="0"/>
-              <a:t>A'</a:t>
-            </a:r>
-            <a:endParaRPr lang="en-NL" dirty="0"/>
-          </a:p>
-        </p:txBody>
-      </p:sp>
-      <p:sp>
-        <p:nvSpPr>
-          <p:cNvPr id="15" name="Rectangle 14">
-            <a:extLst>
-              <a:ext uri="{FF2B5EF4-FFF2-40B4-BE49-F238E27FC236}">
-                <a16:creationId xmlns:a16="http://schemas.microsoft.com/office/drawing/2014/main" id="{5719D04C-DF29-F713-85E1-3BBFB134E914}"/>
-              </a:ext>
-            </a:extLst>
-          </p:cNvPr>
-          <p:cNvSpPr/>
-          <p:nvPr/>
-        </p:nvSpPr>
-        <p:spPr>
-          <a:xfrm>
-            <a:off x="4377467" y="4091847"/>
-            <a:ext cx="842405" cy="689211"/>
-          </a:xfrm>
-          <a:prstGeom prst="rect">
-            <a:avLst/>
-          </a:prstGeom>
-        </p:spPr>
-        <p:style>
-          <a:lnRef idx="1">
-            <a:schemeClr val="accent6"/>
-          </a:lnRef>
-          <a:fillRef idx="2">
-            <a:schemeClr val="accent6"/>
-          </a:fillRef>
-          <a:effectRef idx="1">
-            <a:schemeClr val="accent6"/>
-          </a:effectRef>
-          <a:fontRef idx="minor">
-            <a:schemeClr val="dk1"/>
-          </a:fontRef>
-        </p:style>
-        <p:txBody>
-          <a:bodyPr rtlCol="0" anchor="ctr"/>
-          <a:lstStyle/>
-          <a:p>
-            <a:pPr algn="ctr"/>
-            <a:r>
-              <a:rPr lang="en-US" dirty="0"/>
-              <a:t>B'</a:t>
-            </a:r>
-            <a:endParaRPr lang="en-NL" dirty="0"/>
-          </a:p>
-        </p:txBody>
-      </p:sp>
-      <p:sp>
-        <p:nvSpPr>
-          <p:cNvPr id="16" name="Rectangle: Rounded Corners 15">
-            <a:extLst>
-              <a:ext uri="{FF2B5EF4-FFF2-40B4-BE49-F238E27FC236}">
-                <a16:creationId xmlns:a16="http://schemas.microsoft.com/office/drawing/2014/main" id="{6A387B69-4184-8E4A-E048-DBBF3218B85F}"/>
-              </a:ext>
-            </a:extLst>
-          </p:cNvPr>
-          <p:cNvSpPr/>
-          <p:nvPr/>
-        </p:nvSpPr>
-        <p:spPr>
-          <a:xfrm>
-            <a:off x="2433084" y="4102287"/>
-            <a:ext cx="1344304" cy="689211"/>
-          </a:xfrm>
-          <a:prstGeom prst="roundRect">
-            <a:avLst/>
-          </a:prstGeom>
-        </p:spPr>
-        <p:style>
-          <a:lnRef idx="1">
-            <a:schemeClr val="accent5"/>
-          </a:lnRef>
-          <a:fillRef idx="2">
-            <a:schemeClr val="accent5"/>
-          </a:fillRef>
-          <a:effectRef idx="1">
-            <a:schemeClr val="accent5"/>
-          </a:effectRef>
-          <a:fontRef idx="minor">
-            <a:schemeClr val="dk1"/>
-          </a:fontRef>
-        </p:style>
-        <p:txBody>
-          <a:bodyPr rtlCol="0" anchor="ctr"/>
-          <a:lstStyle/>
-          <a:p>
-            <a:pPr algn="ctr"/>
-            <a:r>
-              <a:rPr lang="en-US" dirty="0" err="1"/>
-              <a:t>fillna</a:t>
-            </a:r>
-            <a:r>
-              <a:rPr lang="en-US" dirty="0"/>
-              <a:t>(0)</a:t>
-            </a:r>
-            <a:endParaRPr lang="en-NL" dirty="0"/>
-          </a:p>
-        </p:txBody>
-      </p:sp>
+        </p:grpSpPr>
+        <p:sp>
+          <p:nvSpPr>
+            <p:cNvPr id="14" name="Rectangle 13">
+              <a:extLst>
+                <a:ext uri="{FF2B5EF4-FFF2-40B4-BE49-F238E27FC236}">
+                  <a16:creationId xmlns:a16="http://schemas.microsoft.com/office/drawing/2014/main" id="{CEE4A8F5-EECE-9EB4-1AAF-C709B49710D8}"/>
+                </a:ext>
+              </a:extLst>
+            </p:cNvPr>
+            <p:cNvSpPr/>
+            <p:nvPr/>
+          </p:nvSpPr>
+          <p:spPr>
+            <a:xfrm>
+              <a:off x="4372599" y="3706088"/>
+              <a:ext cx="842405" cy="689211"/>
+            </a:xfrm>
+            <a:prstGeom prst="rect">
+              <a:avLst/>
+            </a:prstGeom>
+          </p:spPr>
+          <p:style>
+            <a:lnRef idx="1">
+              <a:schemeClr val="accent6"/>
+            </a:lnRef>
+            <a:fillRef idx="2">
+              <a:schemeClr val="accent6"/>
+            </a:fillRef>
+            <a:effectRef idx="1">
+              <a:schemeClr val="accent6"/>
+            </a:effectRef>
+            <a:fontRef idx="minor">
+              <a:schemeClr val="dk1"/>
+            </a:fontRef>
+          </p:style>
+          <p:txBody>
+            <a:bodyPr rtlCol="0" anchor="ctr"/>
+            <a:lstStyle/>
+            <a:p>
+              <a:pPr algn="ctr"/>
+              <a:r>
+                <a:rPr lang="en-US" dirty="0"/>
+                <a:t>Score</a:t>
+              </a:r>
+              <a:endParaRPr lang="en-NL" dirty="0"/>
+            </a:p>
+          </p:txBody>
+        </p:sp>
+        <p:sp>
+          <p:nvSpPr>
+            <p:cNvPr id="25" name="Rectangle: Rounded Corners 24">
+              <a:extLst>
+                <a:ext uri="{FF2B5EF4-FFF2-40B4-BE49-F238E27FC236}">
+                  <a16:creationId xmlns:a16="http://schemas.microsoft.com/office/drawing/2014/main" id="{2C713476-FA46-6D89-7672-5D26B170C381}"/>
+                </a:ext>
+              </a:extLst>
+            </p:cNvPr>
+            <p:cNvSpPr/>
+            <p:nvPr/>
+          </p:nvSpPr>
+          <p:spPr>
+            <a:xfrm>
+              <a:off x="2428215" y="3706088"/>
+              <a:ext cx="1344304" cy="689211"/>
+            </a:xfrm>
+            <a:prstGeom prst="roundRect">
+              <a:avLst/>
+            </a:prstGeom>
+          </p:spPr>
+          <p:style>
+            <a:lnRef idx="1">
+              <a:schemeClr val="accent5"/>
+            </a:lnRef>
+            <a:fillRef idx="2">
+              <a:schemeClr val="accent5"/>
+            </a:fillRef>
+            <a:effectRef idx="1">
+              <a:schemeClr val="accent5"/>
+            </a:effectRef>
+            <a:fontRef idx="minor">
+              <a:schemeClr val="dk1"/>
+            </a:fontRef>
+          </p:style>
+          <p:txBody>
+            <a:bodyPr rtlCol="0" anchor="ctr"/>
+            <a:lstStyle/>
+            <a:p>
+              <a:pPr algn="ctr"/>
+              <a:r>
+                <a:rPr lang="en-US" dirty="0" err="1"/>
+                <a:t>fillna</a:t>
+              </a:r>
+              <a:r>
+                <a:rPr lang="en-US" dirty="0"/>
+                <a:t>(</a:t>
+              </a:r>
+              <a:r>
+                <a:rPr lang="en-US" b="1" dirty="0"/>
+                <a:t>0</a:t>
+              </a:r>
+              <a:r>
+                <a:rPr lang="en-US" dirty="0"/>
+                <a:t>)</a:t>
+              </a:r>
+              <a:endParaRPr lang="en-NL" dirty="0"/>
+            </a:p>
+          </p:txBody>
+        </p:sp>
+        <p:cxnSp>
+          <p:nvCxnSpPr>
+            <p:cNvPr id="29" name="Straight Arrow Connector 28">
+              <a:extLst>
+                <a:ext uri="{FF2B5EF4-FFF2-40B4-BE49-F238E27FC236}">
+                  <a16:creationId xmlns:a16="http://schemas.microsoft.com/office/drawing/2014/main" id="{49E1EFDE-7A71-6498-80E1-B0AC9E83282B}"/>
+                </a:ext>
+              </a:extLst>
+            </p:cNvPr>
+            <p:cNvCxnSpPr>
+              <a:cxnSpLocks/>
+              <a:stCxn id="25" idx="3"/>
+              <a:endCxn id="14" idx="1"/>
+            </p:cNvCxnSpPr>
+            <p:nvPr/>
+          </p:nvCxnSpPr>
+          <p:spPr>
+            <a:xfrm>
+              <a:off x="3772519" y="4050694"/>
+              <a:ext cx="600080" cy="0"/>
+            </a:xfrm>
+            <a:prstGeom prst="straightConnector1">
+              <a:avLst/>
+            </a:prstGeom>
+            <a:ln>
+              <a:tailEnd type="triangle"/>
+            </a:ln>
+          </p:spPr>
+          <p:style>
+            <a:lnRef idx="3">
+              <a:schemeClr val="dk1"/>
+            </a:lnRef>
+            <a:fillRef idx="0">
+              <a:schemeClr val="dk1"/>
+            </a:fillRef>
+            <a:effectRef idx="2">
+              <a:schemeClr val="dk1"/>
+            </a:effectRef>
+            <a:fontRef idx="minor">
+              <a:schemeClr val="tx1"/>
+            </a:fontRef>
+          </p:style>
+        </p:cxnSp>
+        <p:pic>
+          <p:nvPicPr>
+            <p:cNvPr id="31" name="Graphic 30" descr="Brain in head">
+              <a:extLst>
+                <a:ext uri="{FF2B5EF4-FFF2-40B4-BE49-F238E27FC236}">
+                  <a16:creationId xmlns:a16="http://schemas.microsoft.com/office/drawing/2014/main" id="{3D685FCA-1D87-3F47-AF26-9D720270B97F}"/>
+                </a:ext>
+              </a:extLst>
+            </p:cNvPr>
+            <p:cNvPicPr>
+              <a:picLocks noChangeAspect="1"/>
+            </p:cNvPicPr>
+            <p:nvPr/>
+          </p:nvPicPr>
+          <p:blipFill>
+            <a:blip r:embed="rId2">
+              <a:extLst>
+                <a:ext uri="{96DAC541-7B7A-43D3-8B79-37D633B846F1}">
+                  <asvg:svgBlip xmlns:asvg="http://schemas.microsoft.com/office/drawing/2016/SVG/main" r:embed="rId3"/>
+                </a:ext>
+              </a:extLst>
+            </a:blip>
+            <a:stretch>
+              <a:fillRect/>
+            </a:stretch>
+          </p:blipFill>
+          <p:spPr>
+            <a:xfrm>
+              <a:off x="1022493" y="3584100"/>
+              <a:ext cx="914400" cy="914400"/>
+            </a:xfrm>
+            <a:prstGeom prst="rect">
+              <a:avLst/>
+            </a:prstGeom>
+          </p:spPr>
+        </p:pic>
+      </p:grpSp>
       <p:cxnSp>
         <p:nvCxnSpPr>
-          <p:cNvPr id="18" name="Straight Arrow Connector 17">
-            <a:extLst>
-              <a:ext uri="{FF2B5EF4-FFF2-40B4-BE49-F238E27FC236}">
-                <a16:creationId xmlns:a16="http://schemas.microsoft.com/office/drawing/2014/main" id="{FBEDC15F-9A4D-487E-0048-71724C1AAFDC}"/>
+          <p:cNvPr id="39" name="Connector: Curved 38">
+            <a:extLst>
+              <a:ext uri="{FF2B5EF4-FFF2-40B4-BE49-F238E27FC236}">
+                <a16:creationId xmlns:a16="http://schemas.microsoft.com/office/drawing/2014/main" id="{73F96E77-EE3D-1176-6869-9A8CD1FAF196}"/>
               </a:ext>
             </a:extLst>
           </p:cNvPr>
           <p:cNvCxnSpPr>
             <a:cxnSpLocks/>
-            <a:stCxn id="10" idx="3"/>
-            <a:endCxn id="16" idx="1"/>
+            <a:stCxn id="31" idx="0"/>
+            <a:endCxn id="25" idx="0"/>
           </p:cNvCxnSpPr>
           <p:nvPr/>
         </p:nvCxnSpPr>
         <p:spPr>
-          <a:xfrm>
-            <a:off x="1833004" y="4436453"/>
-            <a:ext cx="600080" cy="10440"/>
+          <a:xfrm rot="16200000" flipH="1">
+            <a:off x="2229036" y="2834757"/>
+            <a:ext cx="121988" cy="1620674"/>
           </a:xfrm>
-          <a:prstGeom prst="straightConnector1">
-            <a:avLst/>
+          <a:prstGeom prst="curvedConnector3">
+            <a:avLst>
+              <a:gd name="adj1" fmla="val -270682"/>
+            </a:avLst>
           </a:prstGeom>
           <a:ln>
             <a:tailEnd type="triangle"/>
           </a:ln>
         </p:spPr>
         <p:style>
-          <a:lnRef idx="2">
+          <a:lnRef idx="3">
             <a:schemeClr val="dk1"/>
           </a:lnRef>
           <a:fillRef idx="0">
             <a:schemeClr val="dk1"/>
           </a:fillRef>
-          <a:effectRef idx="1">
-            <a:schemeClr val="dk1"/>
-          </a:effectRef>
-          <a:fontRef idx="minor">
-            <a:schemeClr val="tx1"/>
-          </a:fontRef>
-        </p:style>
-      </p:cxnSp>
-      <p:cxnSp>
-        <p:nvCxnSpPr>
-          <p:cNvPr id="20" name="Straight Arrow Connector 19">
-            <a:extLst>
-              <a:ext uri="{FF2B5EF4-FFF2-40B4-BE49-F238E27FC236}">
-                <a16:creationId xmlns:a16="http://schemas.microsoft.com/office/drawing/2014/main" id="{3B0AD017-42B4-086B-9253-7795CB491924}"/>
-              </a:ext>
-            </a:extLst>
-          </p:cNvPr>
-          <p:cNvCxnSpPr>
-            <a:cxnSpLocks/>
-            <a:stCxn id="16" idx="3"/>
-            <a:endCxn id="15" idx="1"/>
-          </p:cNvCxnSpPr>
-          <p:nvPr/>
-        </p:nvCxnSpPr>
-        <p:spPr>
-          <a:xfrm flipV="1">
-            <a:off x="3777388" y="4436453"/>
-            <a:ext cx="600079" cy="10440"/>
-          </a:xfrm>
-          <a:prstGeom prst="straightConnector1">
-            <a:avLst/>
-          </a:prstGeom>
-          <a:ln>
-            <a:tailEnd type="triangle"/>
-          </a:ln>
-        </p:spPr>
-        <p:style>
-          <a:lnRef idx="2">
-            <a:schemeClr val="dk1"/>
-          </a:lnRef>
-          <a:fillRef idx="0">
-            <a:schemeClr val="dk1"/>
-          </a:fillRef>
-          <a:effectRef idx="1">
-            <a:schemeClr val="dk1"/>
-          </a:effectRef>
-          <a:fontRef idx="minor">
-            <a:schemeClr val="tx1"/>
-          </a:fontRef>
-        </p:style>
-      </p:cxnSp>
-      <p:sp>
-        <p:nvSpPr>
-          <p:cNvPr id="25" name="Rectangle: Rounded Corners 24">
-            <a:extLst>
-              <a:ext uri="{FF2B5EF4-FFF2-40B4-BE49-F238E27FC236}">
-                <a16:creationId xmlns:a16="http://schemas.microsoft.com/office/drawing/2014/main" id="{2C713476-FA46-6D89-7672-5D26B170C381}"/>
-              </a:ext>
-            </a:extLst>
-          </p:cNvPr>
-          <p:cNvSpPr/>
-          <p:nvPr/>
-        </p:nvSpPr>
-        <p:spPr>
-          <a:xfrm>
-            <a:off x="2433084" y="2564424"/>
-            <a:ext cx="1344304" cy="689211"/>
-          </a:xfrm>
-          <a:prstGeom prst="roundRect">
-            <a:avLst/>
-          </a:prstGeom>
-        </p:spPr>
-        <p:style>
-          <a:lnRef idx="1">
-            <a:schemeClr val="accent5"/>
-          </a:lnRef>
-          <a:fillRef idx="2">
-            <a:schemeClr val="accent5"/>
-          </a:fillRef>
-          <a:effectRef idx="1">
-            <a:schemeClr val="accent5"/>
-          </a:effectRef>
-          <a:fontRef idx="minor">
-            <a:schemeClr val="dk1"/>
-          </a:fontRef>
-        </p:style>
-        <p:txBody>
-          <a:bodyPr rtlCol="0" anchor="ctr"/>
-          <a:lstStyle/>
-          <a:p>
-            <a:pPr algn="ctr"/>
-            <a:r>
-              <a:rPr lang="en-US" dirty="0" err="1"/>
-              <a:t>fillna</a:t>
-            </a:r>
-            <a:r>
-              <a:rPr lang="en-US" dirty="0"/>
-              <a:t>(0)</a:t>
-            </a:r>
-            <a:endParaRPr lang="en-NL" dirty="0"/>
-          </a:p>
-        </p:txBody>
-      </p:sp>
-      <p:cxnSp>
-        <p:nvCxnSpPr>
-          <p:cNvPr id="27" name="Straight Arrow Connector 26">
-            <a:extLst>
-              <a:ext uri="{FF2B5EF4-FFF2-40B4-BE49-F238E27FC236}">
-                <a16:creationId xmlns:a16="http://schemas.microsoft.com/office/drawing/2014/main" id="{319B4E24-4425-C5BC-C19F-9F16CC5264B9}"/>
-              </a:ext>
-            </a:extLst>
-          </p:cNvPr>
-          <p:cNvCxnSpPr>
-            <a:stCxn id="7" idx="3"/>
-            <a:endCxn id="25" idx="1"/>
-          </p:cNvCxnSpPr>
-          <p:nvPr/>
-        </p:nvCxnSpPr>
-        <p:spPr>
-          <a:xfrm>
-            <a:off x="1833005" y="2909030"/>
-            <a:ext cx="600079" cy="0"/>
-          </a:xfrm>
-          <a:prstGeom prst="straightConnector1">
-            <a:avLst/>
-          </a:prstGeom>
-          <a:ln>
-            <a:tailEnd type="triangle"/>
-          </a:ln>
-        </p:spPr>
-        <p:style>
-          <a:lnRef idx="2">
-            <a:schemeClr val="dk1"/>
-          </a:lnRef>
-          <a:fillRef idx="0">
-            <a:schemeClr val="dk1"/>
-          </a:fillRef>
-          <a:effectRef idx="1">
-            <a:schemeClr val="dk1"/>
-          </a:effectRef>
-          <a:fontRef idx="minor">
-            <a:schemeClr val="tx1"/>
-          </a:fontRef>
-        </p:style>
-      </p:cxnSp>
-      <p:cxnSp>
-        <p:nvCxnSpPr>
-          <p:cNvPr id="29" name="Straight Arrow Connector 28">
-            <a:extLst>
-              <a:ext uri="{FF2B5EF4-FFF2-40B4-BE49-F238E27FC236}">
-                <a16:creationId xmlns:a16="http://schemas.microsoft.com/office/drawing/2014/main" id="{49E1EFDE-7A71-6498-80E1-B0AC9E83282B}"/>
-              </a:ext>
-            </a:extLst>
-          </p:cNvPr>
-          <p:cNvCxnSpPr>
-            <a:cxnSpLocks/>
-            <a:stCxn id="25" idx="3"/>
-            <a:endCxn id="14" idx="1"/>
-          </p:cNvCxnSpPr>
-          <p:nvPr/>
-        </p:nvCxnSpPr>
-        <p:spPr>
-          <a:xfrm>
-            <a:off x="3777388" y="2909030"/>
-            <a:ext cx="600080" cy="0"/>
-          </a:xfrm>
-          <a:prstGeom prst="straightConnector1">
-            <a:avLst/>
-          </a:prstGeom>
-          <a:ln>
-            <a:tailEnd type="triangle"/>
-          </a:ln>
-        </p:spPr>
-        <p:style>
-          <a:lnRef idx="2">
-            <a:schemeClr val="dk1"/>
-          </a:lnRef>
-          <a:fillRef idx="0">
-            <a:schemeClr val="dk1"/>
-          </a:fillRef>
-          <a:effectRef idx="1">
-            <a:schemeClr val="dk1"/>
-          </a:effectRef>
-          <a:fontRef idx="minor">
-            <a:schemeClr val="tx1"/>
-          </a:fontRef>
-        </p:style>
-      </p:cxnSp>
-      <p:sp>
-        <p:nvSpPr>
-          <p:cNvPr id="43" name="TextBox 42">
-            <a:extLst>
-              <a:ext uri="{FF2B5EF4-FFF2-40B4-BE49-F238E27FC236}">
-                <a16:creationId xmlns:a16="http://schemas.microsoft.com/office/drawing/2014/main" id="{1E0F6E3C-3A1B-A60C-F359-7225143B1964}"/>
-              </a:ext>
-            </a:extLst>
-          </p:cNvPr>
-          <p:cNvSpPr txBox="1"/>
-          <p:nvPr/>
-        </p:nvSpPr>
-        <p:spPr>
-          <a:xfrm>
-            <a:off x="6487238" y="2197585"/>
-            <a:ext cx="842404" cy="369332"/>
-          </a:xfrm>
-          <a:prstGeom prst="rect">
-            <a:avLst/>
-          </a:prstGeom>
-          <a:noFill/>
-        </p:spPr>
-        <p:txBody>
-          <a:bodyPr wrap="square" rtlCol="0">
-            <a:spAutoFit/>
-          </a:bodyPr>
-          <a:lstStyle/>
-          <a:p>
-            <a:pPr algn="ctr"/>
-            <a:r>
-              <a:rPr lang="en-US" dirty="0"/>
-              <a:t>m=3.2</a:t>
-            </a:r>
-            <a:endParaRPr lang="en-NL" dirty="0"/>
-          </a:p>
-        </p:txBody>
-      </p:sp>
-      <p:sp>
-        <p:nvSpPr>
-          <p:cNvPr id="44" name="TextBox 43">
-            <a:extLst>
-              <a:ext uri="{FF2B5EF4-FFF2-40B4-BE49-F238E27FC236}">
-                <a16:creationId xmlns:a16="http://schemas.microsoft.com/office/drawing/2014/main" id="{15DCD127-D37C-0967-649A-55AE5712A931}"/>
-              </a:ext>
-            </a:extLst>
-          </p:cNvPr>
-          <p:cNvSpPr txBox="1"/>
-          <p:nvPr/>
-        </p:nvSpPr>
-        <p:spPr>
-          <a:xfrm>
-            <a:off x="6487237" y="3727421"/>
-            <a:ext cx="842403" cy="369332"/>
-          </a:xfrm>
-          <a:prstGeom prst="rect">
-            <a:avLst/>
-          </a:prstGeom>
-          <a:noFill/>
-        </p:spPr>
-        <p:txBody>
-          <a:bodyPr wrap="square" rtlCol="0">
-            <a:spAutoFit/>
-          </a:bodyPr>
-          <a:lstStyle/>
-          <a:p>
-            <a:r>
-              <a:rPr lang="en-US" dirty="0"/>
-              <a:t>m=2.7</a:t>
-            </a:r>
-            <a:endParaRPr lang="en-NL" dirty="0"/>
-          </a:p>
-        </p:txBody>
-      </p:sp>
-      <p:sp>
-        <p:nvSpPr>
-          <p:cNvPr id="62" name="Rectangle 61">
-            <a:extLst>
-              <a:ext uri="{FF2B5EF4-FFF2-40B4-BE49-F238E27FC236}">
-                <a16:creationId xmlns:a16="http://schemas.microsoft.com/office/drawing/2014/main" id="{6D2E12B5-F590-C0FB-BDF1-66A140ADD549}"/>
-              </a:ext>
-            </a:extLst>
-          </p:cNvPr>
-          <p:cNvSpPr/>
-          <p:nvPr/>
-        </p:nvSpPr>
-        <p:spPr>
-          <a:xfrm>
-            <a:off x="6487237" y="2564681"/>
-            <a:ext cx="842405" cy="689211"/>
-          </a:xfrm>
-          <a:prstGeom prst="rect">
-            <a:avLst/>
-          </a:prstGeom>
-        </p:spPr>
-        <p:style>
-          <a:lnRef idx="1">
-            <a:schemeClr val="accent4"/>
-          </a:lnRef>
-          <a:fillRef idx="2">
-            <a:schemeClr val="accent4"/>
-          </a:fillRef>
-          <a:effectRef idx="1">
-            <a:schemeClr val="accent4"/>
-          </a:effectRef>
-          <a:fontRef idx="minor">
-            <a:schemeClr val="dk1"/>
-          </a:fontRef>
-        </p:style>
-        <p:txBody>
-          <a:bodyPr rtlCol="0" anchor="ctr"/>
-          <a:lstStyle/>
-          <a:p>
-            <a:pPr algn="ctr"/>
-            <a:r>
-              <a:rPr lang="en-US" dirty="0"/>
-              <a:t>A</a:t>
-            </a:r>
-            <a:endParaRPr lang="en-NL" dirty="0"/>
-          </a:p>
-        </p:txBody>
-      </p:sp>
-      <p:sp>
-        <p:nvSpPr>
-          <p:cNvPr id="63" name="Rectangle 62">
-            <a:extLst>
-              <a:ext uri="{FF2B5EF4-FFF2-40B4-BE49-F238E27FC236}">
-                <a16:creationId xmlns:a16="http://schemas.microsoft.com/office/drawing/2014/main" id="{4A52D851-DB40-DFCE-21CF-302224392D7F}"/>
-              </a:ext>
-            </a:extLst>
-          </p:cNvPr>
-          <p:cNvSpPr/>
-          <p:nvPr/>
-        </p:nvSpPr>
-        <p:spPr>
-          <a:xfrm>
-            <a:off x="6487236" y="4092104"/>
-            <a:ext cx="842405" cy="689211"/>
-          </a:xfrm>
-          <a:prstGeom prst="rect">
-            <a:avLst/>
-          </a:prstGeom>
-        </p:spPr>
-        <p:style>
-          <a:lnRef idx="1">
-            <a:schemeClr val="accent4"/>
-          </a:lnRef>
-          <a:fillRef idx="2">
-            <a:schemeClr val="accent4"/>
-          </a:fillRef>
-          <a:effectRef idx="1">
-            <a:schemeClr val="accent4"/>
-          </a:effectRef>
-          <a:fontRef idx="minor">
-            <a:schemeClr val="dk1"/>
-          </a:fontRef>
-        </p:style>
-        <p:txBody>
-          <a:bodyPr rtlCol="0" anchor="ctr"/>
-          <a:lstStyle/>
-          <a:p>
-            <a:pPr algn="ctr"/>
-            <a:r>
-              <a:rPr lang="en-US" dirty="0"/>
-              <a:t>B</a:t>
-            </a:r>
-            <a:endParaRPr lang="en-NL" dirty="0"/>
-          </a:p>
-        </p:txBody>
-      </p:sp>
-      <p:sp>
-        <p:nvSpPr>
-          <p:cNvPr id="64" name="Rectangle 63">
-            <a:extLst>
-              <a:ext uri="{FF2B5EF4-FFF2-40B4-BE49-F238E27FC236}">
-                <a16:creationId xmlns:a16="http://schemas.microsoft.com/office/drawing/2014/main" id="{70737AA2-EA09-9E2D-5DE8-9357BE7015C4}"/>
-              </a:ext>
-            </a:extLst>
-          </p:cNvPr>
-          <p:cNvSpPr/>
-          <p:nvPr/>
-        </p:nvSpPr>
-        <p:spPr>
-          <a:xfrm>
-            <a:off x="9874105" y="2564681"/>
-            <a:ext cx="842405" cy="689211"/>
-          </a:xfrm>
-          <a:prstGeom prst="rect">
-            <a:avLst/>
-          </a:prstGeom>
-        </p:spPr>
-        <p:style>
-          <a:lnRef idx="1">
-            <a:schemeClr val="accent6"/>
-          </a:lnRef>
-          <a:fillRef idx="2">
-            <a:schemeClr val="accent6"/>
-          </a:fillRef>
-          <a:effectRef idx="1">
-            <a:schemeClr val="accent6"/>
-          </a:effectRef>
-          <a:fontRef idx="minor">
-            <a:schemeClr val="dk1"/>
-          </a:fontRef>
-        </p:style>
-        <p:txBody>
-          <a:bodyPr rtlCol="0" anchor="ctr"/>
-          <a:lstStyle/>
-          <a:p>
-            <a:pPr algn="ctr"/>
-            <a:r>
-              <a:rPr lang="en-US" dirty="0"/>
-              <a:t>A'</a:t>
-            </a:r>
-            <a:endParaRPr lang="en-NL" dirty="0"/>
-          </a:p>
-        </p:txBody>
-      </p:sp>
-      <p:sp>
-        <p:nvSpPr>
-          <p:cNvPr id="65" name="Rectangle 64">
-            <a:extLst>
-              <a:ext uri="{FF2B5EF4-FFF2-40B4-BE49-F238E27FC236}">
-                <a16:creationId xmlns:a16="http://schemas.microsoft.com/office/drawing/2014/main" id="{595EB6EA-AF34-E510-F336-789B2E931088}"/>
-              </a:ext>
-            </a:extLst>
-          </p:cNvPr>
-          <p:cNvSpPr/>
-          <p:nvPr/>
-        </p:nvSpPr>
-        <p:spPr>
-          <a:xfrm>
-            <a:off x="9874104" y="4092104"/>
-            <a:ext cx="842405" cy="689211"/>
-          </a:xfrm>
-          <a:prstGeom prst="rect">
-            <a:avLst/>
-          </a:prstGeom>
-        </p:spPr>
-        <p:style>
-          <a:lnRef idx="1">
-            <a:schemeClr val="accent6"/>
-          </a:lnRef>
-          <a:fillRef idx="2">
-            <a:schemeClr val="accent6"/>
-          </a:fillRef>
-          <a:effectRef idx="1">
-            <a:schemeClr val="accent6"/>
-          </a:effectRef>
-          <a:fontRef idx="minor">
-            <a:schemeClr val="dk1"/>
-          </a:fontRef>
-        </p:style>
-        <p:txBody>
-          <a:bodyPr rtlCol="0" anchor="ctr"/>
-          <a:lstStyle/>
-          <a:p>
-            <a:pPr algn="ctr"/>
-            <a:r>
-              <a:rPr lang="en-US" dirty="0"/>
-              <a:t>B'</a:t>
-            </a:r>
-            <a:endParaRPr lang="en-NL" dirty="0"/>
-          </a:p>
-        </p:txBody>
-      </p:sp>
-      <p:sp>
-        <p:nvSpPr>
-          <p:cNvPr id="66" name="Rectangle: Rounded Corners 65">
-            <a:extLst>
-              <a:ext uri="{FF2B5EF4-FFF2-40B4-BE49-F238E27FC236}">
-                <a16:creationId xmlns:a16="http://schemas.microsoft.com/office/drawing/2014/main" id="{99BA8FFB-FA87-CFFF-8162-CA153F3CDFAD}"/>
-              </a:ext>
-            </a:extLst>
-          </p:cNvPr>
-          <p:cNvSpPr/>
-          <p:nvPr/>
-        </p:nvSpPr>
-        <p:spPr>
-          <a:xfrm>
-            <a:off x="7929721" y="4102544"/>
-            <a:ext cx="1344304" cy="689211"/>
-          </a:xfrm>
-          <a:prstGeom prst="roundRect">
-            <a:avLst/>
-          </a:prstGeom>
-        </p:spPr>
-        <p:style>
-          <a:lnRef idx="1">
-            <a:schemeClr val="accent5"/>
-          </a:lnRef>
-          <a:fillRef idx="2">
-            <a:schemeClr val="accent5"/>
-          </a:fillRef>
-          <a:effectRef idx="1">
-            <a:schemeClr val="accent5"/>
-          </a:effectRef>
-          <a:fontRef idx="minor">
-            <a:schemeClr val="dk1"/>
-          </a:fontRef>
-        </p:style>
-        <p:txBody>
-          <a:bodyPr rtlCol="0" anchor="ctr"/>
-          <a:lstStyle/>
-          <a:p>
-            <a:pPr algn="ctr"/>
-            <a:r>
-              <a:rPr lang="en-US" dirty="0" err="1"/>
-              <a:t>fillna</a:t>
-            </a:r>
-            <a:r>
-              <a:rPr lang="en-US" dirty="0"/>
-              <a:t>(2.7)</a:t>
-            </a:r>
-            <a:endParaRPr lang="en-NL" dirty="0"/>
-          </a:p>
-        </p:txBody>
-      </p:sp>
-      <p:cxnSp>
-        <p:nvCxnSpPr>
-          <p:cNvPr id="67" name="Straight Arrow Connector 66">
-            <a:extLst>
-              <a:ext uri="{FF2B5EF4-FFF2-40B4-BE49-F238E27FC236}">
-                <a16:creationId xmlns:a16="http://schemas.microsoft.com/office/drawing/2014/main" id="{8BAF9871-8A5F-A22F-0114-1FDD33D097DF}"/>
-              </a:ext>
-            </a:extLst>
-          </p:cNvPr>
-          <p:cNvCxnSpPr>
-            <a:cxnSpLocks/>
-            <a:stCxn id="63" idx="3"/>
-            <a:endCxn id="66" idx="1"/>
-          </p:cNvCxnSpPr>
-          <p:nvPr/>
-        </p:nvCxnSpPr>
-        <p:spPr>
-          <a:xfrm>
-            <a:off x="7329641" y="4436710"/>
-            <a:ext cx="600080" cy="10440"/>
-          </a:xfrm>
-          <a:prstGeom prst="straightConnector1">
-            <a:avLst/>
-          </a:prstGeom>
-          <a:ln>
-            <a:tailEnd type="triangle"/>
-          </a:ln>
-        </p:spPr>
-        <p:style>
-          <a:lnRef idx="2">
-            <a:schemeClr val="dk1"/>
-          </a:lnRef>
-          <a:fillRef idx="0">
-            <a:schemeClr val="dk1"/>
-          </a:fillRef>
-          <a:effectRef idx="1">
-            <a:schemeClr val="dk1"/>
-          </a:effectRef>
-          <a:fontRef idx="minor">
-            <a:schemeClr val="tx1"/>
-          </a:fontRef>
-        </p:style>
-      </p:cxnSp>
-      <p:cxnSp>
-        <p:nvCxnSpPr>
-          <p:cNvPr id="68" name="Straight Arrow Connector 67">
-            <a:extLst>
-              <a:ext uri="{FF2B5EF4-FFF2-40B4-BE49-F238E27FC236}">
-                <a16:creationId xmlns:a16="http://schemas.microsoft.com/office/drawing/2014/main" id="{5897F49F-ADC6-63A4-1938-5476293ACA3F}"/>
-              </a:ext>
-            </a:extLst>
-          </p:cNvPr>
-          <p:cNvCxnSpPr>
-            <a:cxnSpLocks/>
-            <a:stCxn id="66" idx="3"/>
-            <a:endCxn id="65" idx="1"/>
-          </p:cNvCxnSpPr>
-          <p:nvPr/>
-        </p:nvCxnSpPr>
-        <p:spPr>
-          <a:xfrm flipV="1">
-            <a:off x="9274025" y="4436710"/>
-            <a:ext cx="600079" cy="10440"/>
-          </a:xfrm>
-          <a:prstGeom prst="straightConnector1">
-            <a:avLst/>
-          </a:prstGeom>
-          <a:ln>
-            <a:tailEnd type="triangle"/>
-          </a:ln>
-        </p:spPr>
-        <p:style>
-          <a:lnRef idx="2">
-            <a:schemeClr val="dk1"/>
-          </a:lnRef>
-          <a:fillRef idx="0">
-            <a:schemeClr val="dk1"/>
-          </a:fillRef>
-          <a:effectRef idx="1">
-            <a:schemeClr val="dk1"/>
-          </a:effectRef>
-          <a:fontRef idx="minor">
-            <a:schemeClr val="tx1"/>
-          </a:fontRef>
-        </p:style>
-      </p:cxnSp>
-      <p:sp>
-        <p:nvSpPr>
-          <p:cNvPr id="69" name="Rectangle: Rounded Corners 68">
-            <a:extLst>
-              <a:ext uri="{FF2B5EF4-FFF2-40B4-BE49-F238E27FC236}">
-                <a16:creationId xmlns:a16="http://schemas.microsoft.com/office/drawing/2014/main" id="{B80D4A1A-7677-F3A5-E30E-9F185FE42C41}"/>
-              </a:ext>
-            </a:extLst>
-          </p:cNvPr>
-          <p:cNvSpPr/>
-          <p:nvPr/>
-        </p:nvSpPr>
-        <p:spPr>
-          <a:xfrm>
-            <a:off x="7929721" y="2564681"/>
-            <a:ext cx="1344304" cy="689211"/>
-          </a:xfrm>
-          <a:prstGeom prst="roundRect">
-            <a:avLst/>
-          </a:prstGeom>
-        </p:spPr>
-        <p:style>
-          <a:lnRef idx="1">
-            <a:schemeClr val="accent5"/>
-          </a:lnRef>
-          <a:fillRef idx="2">
-            <a:schemeClr val="accent5"/>
-          </a:fillRef>
-          <a:effectRef idx="1">
-            <a:schemeClr val="accent5"/>
-          </a:effectRef>
-          <a:fontRef idx="minor">
-            <a:schemeClr val="dk1"/>
-          </a:fontRef>
-        </p:style>
-        <p:txBody>
-          <a:bodyPr rtlCol="0" anchor="ctr"/>
-          <a:lstStyle/>
-          <a:p>
-            <a:pPr algn="ctr"/>
-            <a:r>
-              <a:rPr lang="en-US" dirty="0" err="1"/>
-              <a:t>fillna</a:t>
-            </a:r>
-            <a:r>
-              <a:rPr lang="en-US" dirty="0"/>
-              <a:t>(3.2)</a:t>
-            </a:r>
-            <a:endParaRPr lang="en-NL" dirty="0"/>
-          </a:p>
-        </p:txBody>
-      </p:sp>
-      <p:cxnSp>
-        <p:nvCxnSpPr>
-          <p:cNvPr id="70" name="Straight Arrow Connector 69">
-            <a:extLst>
-              <a:ext uri="{FF2B5EF4-FFF2-40B4-BE49-F238E27FC236}">
-                <a16:creationId xmlns:a16="http://schemas.microsoft.com/office/drawing/2014/main" id="{EE860CC5-8250-9C5C-FD4D-A2B2A9493BF5}"/>
-              </a:ext>
-            </a:extLst>
-          </p:cNvPr>
-          <p:cNvCxnSpPr>
-            <a:stCxn id="62" idx="3"/>
-            <a:endCxn id="69" idx="1"/>
-          </p:cNvCxnSpPr>
-          <p:nvPr/>
-        </p:nvCxnSpPr>
-        <p:spPr>
-          <a:xfrm>
-            <a:off x="7329642" y="2909287"/>
-            <a:ext cx="600079" cy="0"/>
-          </a:xfrm>
-          <a:prstGeom prst="straightConnector1">
-            <a:avLst/>
-          </a:prstGeom>
-          <a:ln>
-            <a:tailEnd type="triangle"/>
-          </a:ln>
-        </p:spPr>
-        <p:style>
-          <a:lnRef idx="2">
-            <a:schemeClr val="dk1"/>
-          </a:lnRef>
-          <a:fillRef idx="0">
-            <a:schemeClr val="dk1"/>
-          </a:fillRef>
-          <a:effectRef idx="1">
-            <a:schemeClr val="dk1"/>
-          </a:effectRef>
-          <a:fontRef idx="minor">
-            <a:schemeClr val="tx1"/>
-          </a:fontRef>
-        </p:style>
-      </p:cxnSp>
-      <p:cxnSp>
-        <p:nvCxnSpPr>
-          <p:cNvPr id="71" name="Straight Arrow Connector 70">
-            <a:extLst>
-              <a:ext uri="{FF2B5EF4-FFF2-40B4-BE49-F238E27FC236}">
-                <a16:creationId xmlns:a16="http://schemas.microsoft.com/office/drawing/2014/main" id="{23FFCC05-02CC-447A-2940-213DCC0B906D}"/>
-              </a:ext>
-            </a:extLst>
-          </p:cNvPr>
-          <p:cNvCxnSpPr>
-            <a:cxnSpLocks/>
-            <a:stCxn id="69" idx="3"/>
-            <a:endCxn id="64" idx="1"/>
-          </p:cNvCxnSpPr>
-          <p:nvPr/>
-        </p:nvCxnSpPr>
-        <p:spPr>
-          <a:xfrm>
-            <a:off x="9274025" y="2909287"/>
-            <a:ext cx="600080" cy="0"/>
-          </a:xfrm>
-          <a:prstGeom prst="straightConnector1">
-            <a:avLst/>
-          </a:prstGeom>
-          <a:ln>
-            <a:tailEnd type="triangle"/>
-          </a:ln>
-        </p:spPr>
-        <p:style>
-          <a:lnRef idx="2">
-            <a:schemeClr val="dk1"/>
-          </a:lnRef>
-          <a:fillRef idx="0">
-            <a:schemeClr val="dk1"/>
-          </a:fillRef>
-          <a:effectRef idx="1">
+          <a:effectRef idx="2">
             <a:schemeClr val="dk1"/>
           </a:effectRef>
           <a:fontRef idx="minor">
@@ -7913,7 +7480,7 @@
         </p:nvSpPr>
         <p:spPr>
           <a:xfrm>
-            <a:off x="3077573" y="2872597"/>
+            <a:off x="3077573" y="2881833"/>
             <a:ext cx="1782170" cy="369332"/>
           </a:xfrm>
           <a:prstGeom prst="rect">
@@ -8448,27 +8015,207 @@
           </a:p>
         </p:txBody>
       </p:sp>
+      <p:sp>
+        <p:nvSpPr>
+          <p:cNvPr id="26" name="TextBox 25">
+            <a:extLst>
+              <a:ext uri="{FF2B5EF4-FFF2-40B4-BE49-F238E27FC236}">
+                <a16:creationId xmlns:a16="http://schemas.microsoft.com/office/drawing/2014/main" id="{2754FCE4-E189-9943-24CC-9485376AB372}"/>
+              </a:ext>
+            </a:extLst>
+          </p:cNvPr>
+          <p:cNvSpPr txBox="1"/>
+          <p:nvPr/>
+        </p:nvSpPr>
+        <p:spPr>
+          <a:xfrm>
+            <a:off x="7096984" y="2877819"/>
+            <a:ext cx="1701107" cy="369332"/>
+          </a:xfrm>
+          <a:prstGeom prst="rect">
+            <a:avLst/>
+          </a:prstGeom>
+          <a:noFill/>
+        </p:spPr>
+        <p:txBody>
+          <a:bodyPr wrap="none" rtlCol="0">
+            <a:spAutoFit/>
+          </a:bodyPr>
+          <a:lstStyle/>
+          <a:p>
+            <a:r>
+              <a:rPr lang="en-US" dirty="0">
+                <a:latin typeface="Courier New" panose="02070309020205020404" pitchFamily="49" charset="0"/>
+                <a:cs typeface="Courier New" panose="02070309020205020404" pitchFamily="49" charset="0"/>
+              </a:rPr>
+              <a:t>transform()</a:t>
+            </a:r>
+            <a:endParaRPr lang="en-NL" dirty="0">
+              <a:latin typeface="Courier New" panose="02070309020205020404" pitchFamily="49" charset="0"/>
+              <a:cs typeface="Courier New" panose="02070309020205020404" pitchFamily="49" charset="0"/>
+            </a:endParaRPr>
+          </a:p>
+        </p:txBody>
+      </p:sp>
+      <p:sp>
+        <p:nvSpPr>
+          <p:cNvPr id="29" name="TextBox 28">
+            <a:extLst>
+              <a:ext uri="{FF2B5EF4-FFF2-40B4-BE49-F238E27FC236}">
+                <a16:creationId xmlns:a16="http://schemas.microsoft.com/office/drawing/2014/main" id="{3B96C0EB-7058-74D5-FCDE-CF1CE696C866}"/>
+              </a:ext>
+            </a:extLst>
+          </p:cNvPr>
+          <p:cNvSpPr txBox="1"/>
+          <p:nvPr/>
+        </p:nvSpPr>
+        <p:spPr>
+          <a:xfrm>
+            <a:off x="887109" y="2646987"/>
+            <a:ext cx="402609" cy="1200329"/>
+          </a:xfrm>
+          <a:prstGeom prst="rect">
+            <a:avLst/>
+          </a:prstGeom>
+          <a:noFill/>
+        </p:spPr>
+        <p:txBody>
+          <a:bodyPr wrap="square" rtlCol="0">
+            <a:spAutoFit/>
+          </a:bodyPr>
+          <a:lstStyle/>
+          <a:p>
+            <a:r>
+              <a:rPr lang="en-US" dirty="0">
+                <a:latin typeface="Courier New" panose="02070309020205020404" pitchFamily="49" charset="0"/>
+                <a:cs typeface="Courier New" panose="02070309020205020404" pitchFamily="49" charset="0"/>
+              </a:rPr>
+              <a:t>6</a:t>
+            </a:r>
+          </a:p>
+          <a:p>
+            <a:r>
+              <a:rPr lang="en-US" dirty="0">
+                <a:latin typeface="Courier New" panose="02070309020205020404" pitchFamily="49" charset="0"/>
+                <a:cs typeface="Courier New" panose="02070309020205020404" pitchFamily="49" charset="0"/>
+              </a:rPr>
+              <a:t>1</a:t>
+            </a:r>
+          </a:p>
+          <a:p>
+            <a:r>
+              <a:rPr lang="en-US" dirty="0">
+                <a:latin typeface="Courier New" panose="02070309020205020404" pitchFamily="49" charset="0"/>
+                <a:cs typeface="Courier New" panose="02070309020205020404" pitchFamily="49" charset="0"/>
+              </a:rPr>
+              <a:t>4</a:t>
+            </a:r>
+          </a:p>
+          <a:p>
+            <a:r>
+              <a:rPr lang="en-US" dirty="0">
+                <a:latin typeface="Courier New" panose="02070309020205020404" pitchFamily="49" charset="0"/>
+                <a:cs typeface="Courier New" panose="02070309020205020404" pitchFamily="49" charset="0"/>
+              </a:rPr>
+              <a:t>3</a:t>
+            </a:r>
+            <a:endParaRPr lang="en-NL" dirty="0">
+              <a:latin typeface="Courier New" panose="02070309020205020404" pitchFamily="49" charset="0"/>
+              <a:cs typeface="Courier New" panose="02070309020205020404" pitchFamily="49" charset="0"/>
+            </a:endParaRPr>
+          </a:p>
+        </p:txBody>
+      </p:sp>
+      <p:sp>
+        <p:nvSpPr>
+          <p:cNvPr id="30" name="TextBox 29">
+            <a:extLst>
+              <a:ext uri="{FF2B5EF4-FFF2-40B4-BE49-F238E27FC236}">
+                <a16:creationId xmlns:a16="http://schemas.microsoft.com/office/drawing/2014/main" id="{64ECBD68-9822-B3E8-9EA5-61ED479607C7}"/>
+              </a:ext>
+            </a:extLst>
+          </p:cNvPr>
+          <p:cNvSpPr txBox="1"/>
+          <p:nvPr/>
+        </p:nvSpPr>
+        <p:spPr>
+          <a:xfrm>
+            <a:off x="10221155" y="1237670"/>
+            <a:ext cx="634812" cy="1200329"/>
+          </a:xfrm>
+          <a:prstGeom prst="rect">
+            <a:avLst/>
+          </a:prstGeom>
+          <a:noFill/>
+        </p:spPr>
+        <p:txBody>
+          <a:bodyPr wrap="square" rtlCol="0">
+            <a:spAutoFit/>
+          </a:bodyPr>
+          <a:lstStyle/>
+          <a:p>
+            <a:r>
+              <a:rPr lang="en-US" dirty="0">
+                <a:latin typeface="Courier New" panose="02070309020205020404" pitchFamily="49" charset="0"/>
+                <a:cs typeface="Courier New" panose="02070309020205020404" pitchFamily="49" charset="0"/>
+              </a:rPr>
+              <a:t>1</a:t>
+            </a:r>
+          </a:p>
+          <a:p>
+            <a:r>
+              <a:rPr lang="en-US" dirty="0">
+                <a:latin typeface="Courier New" panose="02070309020205020404" pitchFamily="49" charset="0"/>
+                <a:cs typeface="Courier New" panose="02070309020205020404" pitchFamily="49" charset="0"/>
+              </a:rPr>
+              <a:t>9</a:t>
+            </a:r>
+          </a:p>
+          <a:p>
+            <a:r>
+              <a:rPr lang="en-US" dirty="0">
+                <a:latin typeface="Courier New" panose="02070309020205020404" pitchFamily="49" charset="0"/>
+                <a:cs typeface="Courier New" panose="02070309020205020404" pitchFamily="49" charset="0"/>
+              </a:rPr>
+              <a:t>3</a:t>
+            </a:r>
+          </a:p>
+          <a:p>
+            <a:r>
+              <a:rPr lang="en-US" b="1" dirty="0">
+                <a:latin typeface="Courier New" panose="02070309020205020404" pitchFamily="49" charset="0"/>
+                <a:cs typeface="Courier New" panose="02070309020205020404" pitchFamily="49" charset="0"/>
+              </a:rPr>
+              <a:t>NA</a:t>
+            </a:r>
+            <a:endParaRPr lang="en-NL" b="1" dirty="0">
+              <a:latin typeface="Courier New" panose="02070309020205020404" pitchFamily="49" charset="0"/>
+              <a:cs typeface="Courier New" panose="02070309020205020404" pitchFamily="49" charset="0"/>
+            </a:endParaRPr>
+          </a:p>
+        </p:txBody>
+      </p:sp>
       <p:cxnSp>
         <p:nvCxnSpPr>
-          <p:cNvPr id="25" name="Straight Arrow Connector 24">
-            <a:extLst>
-              <a:ext uri="{FF2B5EF4-FFF2-40B4-BE49-F238E27FC236}">
-                <a16:creationId xmlns:a16="http://schemas.microsoft.com/office/drawing/2014/main" id="{41C66B95-50EC-FC89-87CD-5C6260FEBF92}"/>
+          <p:cNvPr id="6" name="Connector: Elbow 5">
+            <a:extLst>
+              <a:ext uri="{FF2B5EF4-FFF2-40B4-BE49-F238E27FC236}">
+                <a16:creationId xmlns:a16="http://schemas.microsoft.com/office/drawing/2014/main" id="{09574D46-336A-CC3A-1CC9-A86BECAE4736}"/>
               </a:ext>
             </a:extLst>
           </p:cNvPr>
           <p:cNvCxnSpPr>
-            <a:stCxn id="11" idx="1"/>
+            <a:stCxn id="11" idx="2"/>
             <a:endCxn id="10" idx="3"/>
           </p:cNvCxnSpPr>
           <p:nvPr/>
         </p:nvCxnSpPr>
         <p:spPr>
-          <a:xfrm flipH="1">
-            <a:off x="6647597" y="1844155"/>
-            <a:ext cx="1787855" cy="1409387"/>
+          <a:xfrm rot="5400000">
+            <a:off x="7634656" y="1561661"/>
+            <a:ext cx="704822" cy="2678940"/>
           </a:xfrm>
-          <a:prstGeom prst="straightConnector1">
+          <a:prstGeom prst="bentConnector2">
             <a:avLst/>
           </a:prstGeom>
           <a:ln>
@@ -8490,186 +8237,6 @@
           </a:fontRef>
         </p:style>
       </p:cxnSp>
-      <p:sp>
-        <p:nvSpPr>
-          <p:cNvPr id="26" name="TextBox 25">
-            <a:extLst>
-              <a:ext uri="{FF2B5EF4-FFF2-40B4-BE49-F238E27FC236}">
-                <a16:creationId xmlns:a16="http://schemas.microsoft.com/office/drawing/2014/main" id="{2754FCE4-E189-9943-24CC-9485376AB372}"/>
-              </a:ext>
-            </a:extLst>
-          </p:cNvPr>
-          <p:cNvSpPr txBox="1"/>
-          <p:nvPr/>
-        </p:nvSpPr>
-        <p:spPr>
-          <a:xfrm>
-            <a:off x="6096000" y="1965685"/>
-            <a:ext cx="1701107" cy="369332"/>
-          </a:xfrm>
-          <a:prstGeom prst="rect">
-            <a:avLst/>
-          </a:prstGeom>
-          <a:noFill/>
-        </p:spPr>
-        <p:txBody>
-          <a:bodyPr wrap="none" rtlCol="0">
-            <a:spAutoFit/>
-          </a:bodyPr>
-          <a:lstStyle/>
-          <a:p>
-            <a:r>
-              <a:rPr lang="en-US" dirty="0">
-                <a:latin typeface="Courier New" panose="02070309020205020404" pitchFamily="49" charset="0"/>
-                <a:cs typeface="Courier New" panose="02070309020205020404" pitchFamily="49" charset="0"/>
-              </a:rPr>
-              <a:t>transform()</a:t>
-            </a:r>
-            <a:endParaRPr lang="en-NL" dirty="0">
-              <a:latin typeface="Courier New" panose="02070309020205020404" pitchFamily="49" charset="0"/>
-              <a:cs typeface="Courier New" panose="02070309020205020404" pitchFamily="49" charset="0"/>
-            </a:endParaRPr>
-          </a:p>
-        </p:txBody>
-      </p:sp>
-      <p:sp>
-        <p:nvSpPr>
-          <p:cNvPr id="29" name="TextBox 28">
-            <a:extLst>
-              <a:ext uri="{FF2B5EF4-FFF2-40B4-BE49-F238E27FC236}">
-                <a16:creationId xmlns:a16="http://schemas.microsoft.com/office/drawing/2014/main" id="{3B96C0EB-7058-74D5-FCDE-CF1CE696C866}"/>
-              </a:ext>
-            </a:extLst>
-          </p:cNvPr>
-          <p:cNvSpPr txBox="1"/>
-          <p:nvPr/>
-        </p:nvSpPr>
-        <p:spPr>
-          <a:xfrm>
-            <a:off x="887109" y="2646987"/>
-            <a:ext cx="402609" cy="1200329"/>
-          </a:xfrm>
-          <a:prstGeom prst="rect">
-            <a:avLst/>
-          </a:prstGeom>
-          <a:noFill/>
-        </p:spPr>
-        <p:txBody>
-          <a:bodyPr wrap="square" rtlCol="0">
-            <a:spAutoFit/>
-          </a:bodyPr>
-          <a:lstStyle/>
-          <a:p>
-            <a:r>
-              <a:rPr lang="en-US" dirty="0">
-                <a:latin typeface="Courier New" panose="02070309020205020404" pitchFamily="49" charset="0"/>
-                <a:cs typeface="Courier New" panose="02070309020205020404" pitchFamily="49" charset="0"/>
-              </a:rPr>
-              <a:t>6</a:t>
-            </a:r>
-          </a:p>
-          <a:p>
-            <a:r>
-              <a:rPr lang="en-US" dirty="0">
-                <a:latin typeface="Courier New" panose="02070309020205020404" pitchFamily="49" charset="0"/>
-                <a:cs typeface="Courier New" panose="02070309020205020404" pitchFamily="49" charset="0"/>
-              </a:rPr>
-              <a:t>1</a:t>
-            </a:r>
-          </a:p>
-          <a:p>
-            <a:r>
-              <a:rPr lang="en-US" dirty="0">
-                <a:latin typeface="Courier New" panose="02070309020205020404" pitchFamily="49" charset="0"/>
-                <a:cs typeface="Courier New" panose="02070309020205020404" pitchFamily="49" charset="0"/>
-              </a:rPr>
-              <a:t>4</a:t>
-            </a:r>
-          </a:p>
-          <a:p>
-            <a:r>
-              <a:rPr lang="en-US" dirty="0">
-                <a:latin typeface="Courier New" panose="02070309020205020404" pitchFamily="49" charset="0"/>
-                <a:cs typeface="Courier New" panose="02070309020205020404" pitchFamily="49" charset="0"/>
-              </a:rPr>
-              <a:t>3</a:t>
-            </a:r>
-            <a:endParaRPr lang="en-NL" dirty="0">
-              <a:latin typeface="Courier New" panose="02070309020205020404" pitchFamily="49" charset="0"/>
-              <a:cs typeface="Courier New" panose="02070309020205020404" pitchFamily="49" charset="0"/>
-            </a:endParaRPr>
-          </a:p>
-        </p:txBody>
-      </p:sp>
-      <p:sp>
-        <p:nvSpPr>
-          <p:cNvPr id="30" name="TextBox 29">
-            <a:extLst>
-              <a:ext uri="{FF2B5EF4-FFF2-40B4-BE49-F238E27FC236}">
-                <a16:creationId xmlns:a16="http://schemas.microsoft.com/office/drawing/2014/main" id="{64ECBD68-9822-B3E8-9EA5-61ED479607C7}"/>
-              </a:ext>
-            </a:extLst>
-          </p:cNvPr>
-          <p:cNvSpPr txBox="1"/>
-          <p:nvPr/>
-        </p:nvSpPr>
-        <p:spPr>
-          <a:xfrm>
-            <a:off x="10221155" y="1237670"/>
-            <a:ext cx="634812" cy="1200329"/>
-          </a:xfrm>
-          <a:prstGeom prst="rect">
-            <a:avLst/>
-          </a:prstGeom>
-          <a:noFill/>
-        </p:spPr>
-        <p:txBody>
-          <a:bodyPr wrap="square" rtlCol="0">
-            <a:spAutoFit/>
-          </a:bodyPr>
-          <a:lstStyle/>
-          <a:p>
-            <a:r>
-              <a:rPr lang="en-US" dirty="0">
-                <a:latin typeface="Courier New" panose="02070309020205020404" pitchFamily="49" charset="0"/>
-                <a:cs typeface="Courier New" panose="02070309020205020404" pitchFamily="49" charset="0"/>
-              </a:rPr>
-              <a:t>1</a:t>
-            </a:r>
-          </a:p>
-          <a:p>
-            <a:r>
-              <a:rPr lang="en-US" dirty="0">
-                <a:latin typeface="Courier New" panose="02070309020205020404" pitchFamily="49" charset="0"/>
-                <a:cs typeface="Courier New" panose="02070309020205020404" pitchFamily="49" charset="0"/>
-              </a:rPr>
-              <a:t>9</a:t>
-            </a:r>
-          </a:p>
-          <a:p>
-            <a:r>
-              <a:rPr lang="en-US" dirty="0">
-                <a:latin typeface="Courier New" panose="02070309020205020404" pitchFamily="49" charset="0"/>
-                <a:cs typeface="Courier New" panose="02070309020205020404" pitchFamily="49" charset="0"/>
-              </a:rPr>
-              <a:t>3</a:t>
-            </a:r>
-          </a:p>
-          <a:p>
-            <a:r>
-              <a:rPr lang="en-US" b="1" dirty="0">
-                <a:latin typeface="Courier New" panose="02070309020205020404" pitchFamily="49" charset="0"/>
-                <a:cs typeface="Courier New" panose="02070309020205020404" pitchFamily="49" charset="0"/>
-              </a:rPr>
-              <a:t>NA</a:t>
-            </a:r>
-            <a:endParaRPr lang="en-NL" b="1" dirty="0">
-              <a:latin typeface="Courier New" panose="02070309020205020404" pitchFamily="49" charset="0"/>
-              <a:cs typeface="Courier New" panose="02070309020205020404" pitchFamily="49" charset="0"/>
-            </a:endParaRPr>
-          </a:p>
-        </p:txBody>
-      </p:sp>
     </p:spTree>
     <p:extLst>
       <p:ext uri="{BB962C8B-B14F-4D97-AF65-F5344CB8AC3E}">
@@ -8931,53 +8498,6 @@
             <a:r>
               <a:rPr lang="nl-NL" dirty="0"/>
               <a:t>data</a:t>
-            </a:r>
-          </a:p>
-        </p:txBody>
-      </p:sp>
-      <p:sp>
-        <p:nvSpPr>
-          <p:cNvPr id="15" name="Rectangle 14">
-            <a:extLst>
-              <a:ext uri="{FF2B5EF4-FFF2-40B4-BE49-F238E27FC236}">
-                <a16:creationId xmlns:a16="http://schemas.microsoft.com/office/drawing/2014/main" id="{5F19AC63-4E65-C8A0-90B6-155E6458E206}"/>
-              </a:ext>
-            </a:extLst>
-          </p:cNvPr>
-          <p:cNvSpPr/>
-          <p:nvPr/>
-        </p:nvSpPr>
-        <p:spPr>
-          <a:xfrm>
-            <a:off x="8435452" y="3958107"/>
-            <a:ext cx="1782170" cy="1409131"/>
-          </a:xfrm>
-          <a:prstGeom prst="rect">
-            <a:avLst/>
-          </a:prstGeom>
-        </p:spPr>
-        <p:style>
-          <a:lnRef idx="1">
-            <a:schemeClr val="accent6"/>
-          </a:lnRef>
-          <a:fillRef idx="2">
-            <a:schemeClr val="accent6"/>
-          </a:fillRef>
-          <a:effectRef idx="1">
-            <a:schemeClr val="accent6"/>
-          </a:effectRef>
-          <a:fontRef idx="minor">
-            <a:schemeClr val="dk1"/>
-          </a:fontRef>
-        </p:style>
-        <p:txBody>
-          <a:bodyPr rtlCol="0" anchor="ctr"/>
-          <a:lstStyle/>
-          <a:p>
-            <a:pPr algn="ctr"/>
-            <a:r>
-              <a:rPr lang="nl-NL" dirty="0"/>
-              <a:t>Geprepareerde data</a:t>
             </a:r>
           </a:p>
         </p:txBody>
@@ -9039,7 +8559,7 @@
         </p:nvSpPr>
         <p:spPr>
           <a:xfrm>
-            <a:off x="3083257" y="2872597"/>
+            <a:off x="3083257" y="2877819"/>
             <a:ext cx="1761128" cy="369332"/>
           </a:xfrm>
           <a:prstGeom prst="rect">
@@ -9111,27 +8631,207 @@
           </a:p>
         </p:txBody>
       </p:sp>
+      <p:sp>
+        <p:nvSpPr>
+          <p:cNvPr id="26" name="TextBox 25">
+            <a:extLst>
+              <a:ext uri="{FF2B5EF4-FFF2-40B4-BE49-F238E27FC236}">
+                <a16:creationId xmlns:a16="http://schemas.microsoft.com/office/drawing/2014/main" id="{2754FCE4-E189-9943-24CC-9485376AB372}"/>
+              </a:ext>
+            </a:extLst>
+          </p:cNvPr>
+          <p:cNvSpPr txBox="1"/>
+          <p:nvPr/>
+        </p:nvSpPr>
+        <p:spPr>
+          <a:xfrm>
+            <a:off x="7096984" y="2877819"/>
+            <a:ext cx="1701107" cy="369332"/>
+          </a:xfrm>
+          <a:prstGeom prst="rect">
+            <a:avLst/>
+          </a:prstGeom>
+          <a:noFill/>
+        </p:spPr>
+        <p:txBody>
+          <a:bodyPr wrap="none" rtlCol="0">
+            <a:spAutoFit/>
+          </a:bodyPr>
+          <a:lstStyle/>
+          <a:p>
+            <a:r>
+              <a:rPr lang="en-US" dirty="0">
+                <a:latin typeface="Courier New" panose="02070309020205020404" pitchFamily="49" charset="0"/>
+                <a:cs typeface="Courier New" panose="02070309020205020404" pitchFamily="49" charset="0"/>
+              </a:rPr>
+              <a:t>transform()</a:t>
+            </a:r>
+            <a:endParaRPr lang="en-NL" dirty="0">
+              <a:latin typeface="Courier New" panose="02070309020205020404" pitchFamily="49" charset="0"/>
+              <a:cs typeface="Courier New" panose="02070309020205020404" pitchFamily="49" charset="0"/>
+            </a:endParaRPr>
+          </a:p>
+        </p:txBody>
+      </p:sp>
+      <p:sp>
+        <p:nvSpPr>
+          <p:cNvPr id="29" name="TextBox 28">
+            <a:extLst>
+              <a:ext uri="{FF2B5EF4-FFF2-40B4-BE49-F238E27FC236}">
+                <a16:creationId xmlns:a16="http://schemas.microsoft.com/office/drawing/2014/main" id="{3B96C0EB-7058-74D5-FCDE-CF1CE696C866}"/>
+              </a:ext>
+            </a:extLst>
+          </p:cNvPr>
+          <p:cNvSpPr txBox="1"/>
+          <p:nvPr/>
+        </p:nvSpPr>
+        <p:spPr>
+          <a:xfrm>
+            <a:off x="887109" y="2646987"/>
+            <a:ext cx="402609" cy="1200329"/>
+          </a:xfrm>
+          <a:prstGeom prst="rect">
+            <a:avLst/>
+          </a:prstGeom>
+          <a:noFill/>
+        </p:spPr>
+        <p:txBody>
+          <a:bodyPr wrap="square" rtlCol="0">
+            <a:spAutoFit/>
+          </a:bodyPr>
+          <a:lstStyle/>
+          <a:p>
+            <a:r>
+              <a:rPr lang="en-US" dirty="0">
+                <a:latin typeface="Courier New" panose="02070309020205020404" pitchFamily="49" charset="0"/>
+                <a:cs typeface="Courier New" panose="02070309020205020404" pitchFamily="49" charset="0"/>
+              </a:rPr>
+              <a:t>6</a:t>
+            </a:r>
+          </a:p>
+          <a:p>
+            <a:r>
+              <a:rPr lang="en-US" dirty="0">
+                <a:latin typeface="Courier New" panose="02070309020205020404" pitchFamily="49" charset="0"/>
+                <a:cs typeface="Courier New" panose="02070309020205020404" pitchFamily="49" charset="0"/>
+              </a:rPr>
+              <a:t>1</a:t>
+            </a:r>
+          </a:p>
+          <a:p>
+            <a:r>
+              <a:rPr lang="en-US" dirty="0">
+                <a:latin typeface="Courier New" panose="02070309020205020404" pitchFamily="49" charset="0"/>
+                <a:cs typeface="Courier New" panose="02070309020205020404" pitchFamily="49" charset="0"/>
+              </a:rPr>
+              <a:t>4</a:t>
+            </a:r>
+          </a:p>
+          <a:p>
+            <a:r>
+              <a:rPr lang="en-US" dirty="0">
+                <a:latin typeface="Courier New" panose="02070309020205020404" pitchFamily="49" charset="0"/>
+                <a:cs typeface="Courier New" panose="02070309020205020404" pitchFamily="49" charset="0"/>
+              </a:rPr>
+              <a:t>3</a:t>
+            </a:r>
+            <a:endParaRPr lang="en-NL" dirty="0">
+              <a:latin typeface="Courier New" panose="02070309020205020404" pitchFamily="49" charset="0"/>
+              <a:cs typeface="Courier New" panose="02070309020205020404" pitchFamily="49" charset="0"/>
+            </a:endParaRPr>
+          </a:p>
+        </p:txBody>
+      </p:sp>
+      <p:sp>
+        <p:nvSpPr>
+          <p:cNvPr id="30" name="TextBox 29">
+            <a:extLst>
+              <a:ext uri="{FF2B5EF4-FFF2-40B4-BE49-F238E27FC236}">
+                <a16:creationId xmlns:a16="http://schemas.microsoft.com/office/drawing/2014/main" id="{64ECBD68-9822-B3E8-9EA5-61ED479607C7}"/>
+              </a:ext>
+            </a:extLst>
+          </p:cNvPr>
+          <p:cNvSpPr txBox="1"/>
+          <p:nvPr/>
+        </p:nvSpPr>
+        <p:spPr>
+          <a:xfrm>
+            <a:off x="10221155" y="1237670"/>
+            <a:ext cx="634812" cy="1200329"/>
+          </a:xfrm>
+          <a:prstGeom prst="rect">
+            <a:avLst/>
+          </a:prstGeom>
+          <a:noFill/>
+        </p:spPr>
+        <p:txBody>
+          <a:bodyPr wrap="square" rtlCol="0">
+            <a:spAutoFit/>
+          </a:bodyPr>
+          <a:lstStyle/>
+          <a:p>
+            <a:r>
+              <a:rPr lang="en-US" dirty="0">
+                <a:latin typeface="Courier New" panose="02070309020205020404" pitchFamily="49" charset="0"/>
+                <a:cs typeface="Courier New" panose="02070309020205020404" pitchFamily="49" charset="0"/>
+              </a:rPr>
+              <a:t>1</a:t>
+            </a:r>
+          </a:p>
+          <a:p>
+            <a:r>
+              <a:rPr lang="en-US" dirty="0">
+                <a:latin typeface="Courier New" panose="02070309020205020404" pitchFamily="49" charset="0"/>
+                <a:cs typeface="Courier New" panose="02070309020205020404" pitchFamily="49" charset="0"/>
+              </a:rPr>
+              <a:t>9</a:t>
+            </a:r>
+          </a:p>
+          <a:p>
+            <a:r>
+              <a:rPr lang="en-US" dirty="0">
+                <a:latin typeface="Courier New" panose="02070309020205020404" pitchFamily="49" charset="0"/>
+                <a:cs typeface="Courier New" panose="02070309020205020404" pitchFamily="49" charset="0"/>
+              </a:rPr>
+              <a:t>3</a:t>
+            </a:r>
+          </a:p>
+          <a:p>
+            <a:r>
+              <a:rPr lang="en-US" b="1" dirty="0">
+                <a:latin typeface="Courier New" panose="02070309020205020404" pitchFamily="49" charset="0"/>
+                <a:cs typeface="Courier New" panose="02070309020205020404" pitchFamily="49" charset="0"/>
+              </a:rPr>
+              <a:t>NA</a:t>
+            </a:r>
+            <a:endParaRPr lang="en-NL" b="1" dirty="0">
+              <a:latin typeface="Courier New" panose="02070309020205020404" pitchFamily="49" charset="0"/>
+              <a:cs typeface="Courier New" panose="02070309020205020404" pitchFamily="49" charset="0"/>
+            </a:endParaRPr>
+          </a:p>
+        </p:txBody>
+      </p:sp>
       <p:cxnSp>
         <p:nvCxnSpPr>
-          <p:cNvPr id="25" name="Straight Arrow Connector 24">
-            <a:extLst>
-              <a:ext uri="{FF2B5EF4-FFF2-40B4-BE49-F238E27FC236}">
-                <a16:creationId xmlns:a16="http://schemas.microsoft.com/office/drawing/2014/main" id="{41C66B95-50EC-FC89-87CD-5C6260FEBF92}"/>
+          <p:cNvPr id="6" name="Connector: Elbow 5">
+            <a:extLst>
+              <a:ext uri="{FF2B5EF4-FFF2-40B4-BE49-F238E27FC236}">
+                <a16:creationId xmlns:a16="http://schemas.microsoft.com/office/drawing/2014/main" id="{09574D46-336A-CC3A-1CC9-A86BECAE4736}"/>
               </a:ext>
             </a:extLst>
           </p:cNvPr>
           <p:cNvCxnSpPr>
-            <a:stCxn id="11" idx="1"/>
+            <a:stCxn id="11" idx="2"/>
             <a:endCxn id="10" idx="3"/>
           </p:cNvCxnSpPr>
           <p:nvPr/>
         </p:nvCxnSpPr>
         <p:spPr>
-          <a:xfrm flipH="1">
-            <a:off x="6647597" y="1844155"/>
-            <a:ext cx="1787855" cy="1409387"/>
+          <a:xfrm rot="5400000">
+            <a:off x="7634656" y="1561661"/>
+            <a:ext cx="704822" cy="2678940"/>
           </a:xfrm>
-          <a:prstGeom prst="straightConnector1">
+          <a:prstGeom prst="bentConnector2">
             <a:avLst/>
           </a:prstGeom>
           <a:ln>
@@ -9155,10 +8855,57 @@
       </p:cxnSp>
       <p:sp>
         <p:nvSpPr>
-          <p:cNvPr id="26" name="TextBox 25">
-            <a:extLst>
-              <a:ext uri="{FF2B5EF4-FFF2-40B4-BE49-F238E27FC236}">
-                <a16:creationId xmlns:a16="http://schemas.microsoft.com/office/drawing/2014/main" id="{2754FCE4-E189-9943-24CC-9485376AB372}"/>
+          <p:cNvPr id="5" name="Rectangle 4">
+            <a:extLst>
+              <a:ext uri="{FF2B5EF4-FFF2-40B4-BE49-F238E27FC236}">
+                <a16:creationId xmlns:a16="http://schemas.microsoft.com/office/drawing/2014/main" id="{B793CC53-53C1-2781-AE3E-B5DC0BC95358}"/>
+              </a:ext>
+            </a:extLst>
+          </p:cNvPr>
+          <p:cNvSpPr/>
+          <p:nvPr/>
+        </p:nvSpPr>
+        <p:spPr>
+          <a:xfrm>
+            <a:off x="8435452" y="3958107"/>
+            <a:ext cx="1782170" cy="1409131"/>
+          </a:xfrm>
+          <a:prstGeom prst="rect">
+            <a:avLst/>
+          </a:prstGeom>
+        </p:spPr>
+        <p:style>
+          <a:lnRef idx="1">
+            <a:schemeClr val="accent6"/>
+          </a:lnRef>
+          <a:fillRef idx="2">
+            <a:schemeClr val="accent6"/>
+          </a:fillRef>
+          <a:effectRef idx="1">
+            <a:schemeClr val="accent6"/>
+          </a:effectRef>
+          <a:fontRef idx="minor">
+            <a:schemeClr val="dk1"/>
+          </a:fontRef>
+        </p:style>
+        <p:txBody>
+          <a:bodyPr rtlCol="0" anchor="ctr"/>
+          <a:lstStyle/>
+          <a:p>
+            <a:pPr algn="ctr"/>
+            <a:r>
+              <a:rPr lang="nl-NL" dirty="0"/>
+              <a:t>Geprepareerde data</a:t>
+            </a:r>
+          </a:p>
+        </p:txBody>
+      </p:sp>
+      <p:sp>
+        <p:nvSpPr>
+          <p:cNvPr id="7" name="TextBox 6">
+            <a:extLst>
+              <a:ext uri="{FF2B5EF4-FFF2-40B4-BE49-F238E27FC236}">
+                <a16:creationId xmlns:a16="http://schemas.microsoft.com/office/drawing/2014/main" id="{251BE889-4FEB-1B2B-65F2-F400EFCC0584}"/>
               </a:ext>
             </a:extLst>
           </p:cNvPr>
@@ -9167,8 +8914,8 @@
         </p:nvSpPr>
         <p:spPr>
           <a:xfrm>
-            <a:off x="6096000" y="1965685"/>
-            <a:ext cx="1701107" cy="369332"/>
+            <a:off x="10230129" y="4062507"/>
+            <a:ext cx="634812" cy="1200329"/>
           </a:xfrm>
           <a:prstGeom prst="rect">
             <a:avLst/>
@@ -9176,7 +8923,7 @@
           <a:noFill/>
         </p:spPr>
         <p:txBody>
-          <a:bodyPr wrap="none" rtlCol="0">
+          <a:bodyPr wrap="square" rtlCol="0">
             <a:spAutoFit/>
           </a:bodyPr>
           <a:lstStyle/>
@@ -9186,9 +8933,36 @@
                 <a:latin typeface="Courier New" panose="02070309020205020404" pitchFamily="49" charset="0"/>
                 <a:cs typeface="Courier New" panose="02070309020205020404" pitchFamily="49" charset="0"/>
               </a:rPr>
-              <a:t>transform()</a:t>
-            </a:r>
-            <a:endParaRPr lang="en-NL" dirty="0">
+              <a:t>1</a:t>
+            </a:r>
+          </a:p>
+          <a:p>
+            <a:r>
+              <a:rPr lang="en-US" dirty="0">
+                <a:latin typeface="Courier New" panose="02070309020205020404" pitchFamily="49" charset="0"/>
+                <a:cs typeface="Courier New" panose="02070309020205020404" pitchFamily="49" charset="0"/>
+              </a:rPr>
+              <a:t>9</a:t>
+            </a:r>
+          </a:p>
+          <a:p>
+            <a:r>
+              <a:rPr lang="en-US" dirty="0">
+                <a:latin typeface="Courier New" panose="02070309020205020404" pitchFamily="49" charset="0"/>
+                <a:cs typeface="Courier New" panose="02070309020205020404" pitchFamily="49" charset="0"/>
+              </a:rPr>
+              <a:t>3</a:t>
+            </a:r>
+          </a:p>
+          <a:p>
+            <a:r>
+              <a:rPr lang="en-US" b="1" dirty="0">
+                <a:latin typeface="Courier New" panose="02070309020205020404" pitchFamily="49" charset="0"/>
+                <a:cs typeface="Courier New" panose="02070309020205020404" pitchFamily="49" charset="0"/>
+              </a:rPr>
+              <a:t>3.5</a:t>
+            </a:r>
+            <a:endParaRPr lang="en-NL" b="1" dirty="0">
               <a:latin typeface="Courier New" panose="02070309020205020404" pitchFamily="49" charset="0"/>
               <a:cs typeface="Courier New" panose="02070309020205020404" pitchFamily="49" charset="0"/>
             </a:endParaRPr>
@@ -9197,25 +8971,25 @@
       </p:sp>
       <p:cxnSp>
         <p:nvCxnSpPr>
-          <p:cNvPr id="28" name="Straight Arrow Connector 27">
-            <a:extLst>
-              <a:ext uri="{FF2B5EF4-FFF2-40B4-BE49-F238E27FC236}">
-                <a16:creationId xmlns:a16="http://schemas.microsoft.com/office/drawing/2014/main" id="{C5AAE9E9-1CB7-6429-6343-3554A13094E4}"/>
+          <p:cNvPr id="9" name="Connector: Elbow 8">
+            <a:extLst>
+              <a:ext uri="{FF2B5EF4-FFF2-40B4-BE49-F238E27FC236}">
+                <a16:creationId xmlns:a16="http://schemas.microsoft.com/office/drawing/2014/main" id="{534F728D-8F84-B342-23D1-713274B7616F}"/>
               </a:ext>
             </a:extLst>
           </p:cNvPr>
           <p:cNvCxnSpPr>
             <a:stCxn id="10" idx="3"/>
-            <a:endCxn id="15" idx="1"/>
+            <a:endCxn id="5" idx="0"/>
           </p:cNvCxnSpPr>
           <p:nvPr/>
         </p:nvCxnSpPr>
         <p:spPr>
           <a:xfrm>
             <a:off x="6647597" y="3253542"/>
-            <a:ext cx="1787855" cy="1409131"/>
+            <a:ext cx="2678940" cy="704565"/>
           </a:xfrm>
-          <a:prstGeom prst="straightConnector1">
+          <a:prstGeom prst="bentConnector2">
             <a:avLst/>
           </a:prstGeom>
           <a:ln>
@@ -9237,217 +9011,10 @@
           </a:fontRef>
         </p:style>
       </p:cxnSp>
-      <p:sp>
-        <p:nvSpPr>
-          <p:cNvPr id="29" name="TextBox 28">
-            <a:extLst>
-              <a:ext uri="{FF2B5EF4-FFF2-40B4-BE49-F238E27FC236}">
-                <a16:creationId xmlns:a16="http://schemas.microsoft.com/office/drawing/2014/main" id="{3B96C0EB-7058-74D5-FCDE-CF1CE696C866}"/>
-              </a:ext>
-            </a:extLst>
-          </p:cNvPr>
-          <p:cNvSpPr txBox="1"/>
-          <p:nvPr/>
-        </p:nvSpPr>
-        <p:spPr>
-          <a:xfrm>
-            <a:off x="887109" y="2646987"/>
-            <a:ext cx="402609" cy="1200329"/>
-          </a:xfrm>
-          <a:prstGeom prst="rect">
-            <a:avLst/>
-          </a:prstGeom>
-          <a:noFill/>
-        </p:spPr>
-        <p:txBody>
-          <a:bodyPr wrap="square" rtlCol="0">
-            <a:spAutoFit/>
-          </a:bodyPr>
-          <a:lstStyle/>
-          <a:p>
-            <a:r>
-              <a:rPr lang="en-US" dirty="0">
-                <a:latin typeface="Courier New" panose="02070309020205020404" pitchFamily="49" charset="0"/>
-                <a:cs typeface="Courier New" panose="02070309020205020404" pitchFamily="49" charset="0"/>
-              </a:rPr>
-              <a:t>6</a:t>
-            </a:r>
-          </a:p>
-          <a:p>
-            <a:r>
-              <a:rPr lang="en-US" dirty="0">
-                <a:latin typeface="Courier New" panose="02070309020205020404" pitchFamily="49" charset="0"/>
-                <a:cs typeface="Courier New" panose="02070309020205020404" pitchFamily="49" charset="0"/>
-              </a:rPr>
-              <a:t>1</a:t>
-            </a:r>
-          </a:p>
-          <a:p>
-            <a:r>
-              <a:rPr lang="en-US" dirty="0">
-                <a:latin typeface="Courier New" panose="02070309020205020404" pitchFamily="49" charset="0"/>
-                <a:cs typeface="Courier New" panose="02070309020205020404" pitchFamily="49" charset="0"/>
-              </a:rPr>
-              <a:t>4</a:t>
-            </a:r>
-          </a:p>
-          <a:p>
-            <a:r>
-              <a:rPr lang="en-US" dirty="0">
-                <a:latin typeface="Courier New" panose="02070309020205020404" pitchFamily="49" charset="0"/>
-                <a:cs typeface="Courier New" panose="02070309020205020404" pitchFamily="49" charset="0"/>
-              </a:rPr>
-              <a:t>3</a:t>
-            </a:r>
-            <a:endParaRPr lang="en-NL" dirty="0">
-              <a:latin typeface="Courier New" panose="02070309020205020404" pitchFamily="49" charset="0"/>
-              <a:cs typeface="Courier New" panose="02070309020205020404" pitchFamily="49" charset="0"/>
-            </a:endParaRPr>
-          </a:p>
-        </p:txBody>
-      </p:sp>
-      <p:sp>
-        <p:nvSpPr>
-          <p:cNvPr id="30" name="TextBox 29">
-            <a:extLst>
-              <a:ext uri="{FF2B5EF4-FFF2-40B4-BE49-F238E27FC236}">
-                <a16:creationId xmlns:a16="http://schemas.microsoft.com/office/drawing/2014/main" id="{64ECBD68-9822-B3E8-9EA5-61ED479607C7}"/>
-              </a:ext>
-            </a:extLst>
-          </p:cNvPr>
-          <p:cNvSpPr txBox="1"/>
-          <p:nvPr/>
-        </p:nvSpPr>
-        <p:spPr>
-          <a:xfrm>
-            <a:off x="10221155" y="1237670"/>
-            <a:ext cx="634812" cy="1200329"/>
-          </a:xfrm>
-          <a:prstGeom prst="rect">
-            <a:avLst/>
-          </a:prstGeom>
-          <a:noFill/>
-        </p:spPr>
-        <p:txBody>
-          <a:bodyPr wrap="square" rtlCol="0">
-            <a:spAutoFit/>
-          </a:bodyPr>
-          <a:lstStyle/>
-          <a:p>
-            <a:r>
-              <a:rPr lang="en-US" dirty="0">
-                <a:latin typeface="Courier New" panose="02070309020205020404" pitchFamily="49" charset="0"/>
-                <a:cs typeface="Courier New" panose="02070309020205020404" pitchFamily="49" charset="0"/>
-              </a:rPr>
-              <a:t>1</a:t>
-            </a:r>
-          </a:p>
-          <a:p>
-            <a:r>
-              <a:rPr lang="en-US" dirty="0">
-                <a:latin typeface="Courier New" panose="02070309020205020404" pitchFamily="49" charset="0"/>
-                <a:cs typeface="Courier New" panose="02070309020205020404" pitchFamily="49" charset="0"/>
-              </a:rPr>
-              <a:t>9</a:t>
-            </a:r>
-          </a:p>
-          <a:p>
-            <a:r>
-              <a:rPr lang="en-US" dirty="0">
-                <a:latin typeface="Courier New" panose="02070309020205020404" pitchFamily="49" charset="0"/>
-                <a:cs typeface="Courier New" panose="02070309020205020404" pitchFamily="49" charset="0"/>
-              </a:rPr>
-              <a:t>3</a:t>
-            </a:r>
-          </a:p>
-          <a:p>
-            <a:r>
-              <a:rPr lang="en-US" b="1" dirty="0">
-                <a:latin typeface="Courier New" panose="02070309020205020404" pitchFamily="49" charset="0"/>
-                <a:cs typeface="Courier New" panose="02070309020205020404" pitchFamily="49" charset="0"/>
-              </a:rPr>
-              <a:t>NA</a:t>
-            </a:r>
-            <a:endParaRPr lang="en-NL" b="1" dirty="0">
-              <a:latin typeface="Courier New" panose="02070309020205020404" pitchFamily="49" charset="0"/>
-              <a:cs typeface="Courier New" panose="02070309020205020404" pitchFamily="49" charset="0"/>
-            </a:endParaRPr>
-          </a:p>
-        </p:txBody>
-      </p:sp>
-      <p:sp>
-        <p:nvSpPr>
-          <p:cNvPr id="31" name="TextBox 30">
-            <a:extLst>
-              <a:ext uri="{FF2B5EF4-FFF2-40B4-BE49-F238E27FC236}">
-                <a16:creationId xmlns:a16="http://schemas.microsoft.com/office/drawing/2014/main" id="{3E6835ED-73FD-3D73-F92A-10434B28712B}"/>
-              </a:ext>
-            </a:extLst>
-          </p:cNvPr>
-          <p:cNvSpPr txBox="1"/>
-          <p:nvPr/>
-        </p:nvSpPr>
-        <p:spPr>
-          <a:xfrm>
-            <a:off x="10230129" y="4062507"/>
-            <a:ext cx="634812" cy="1200329"/>
-          </a:xfrm>
-          <a:prstGeom prst="rect">
-            <a:avLst/>
-          </a:prstGeom>
-          <a:noFill/>
-        </p:spPr>
-        <p:txBody>
-          <a:bodyPr wrap="square" rtlCol="0">
-            <a:spAutoFit/>
-          </a:bodyPr>
-          <a:lstStyle/>
-          <a:p>
-            <a:r>
-              <a:rPr lang="en-US" dirty="0">
-                <a:latin typeface="Courier New" panose="02070309020205020404" pitchFamily="49" charset="0"/>
-                <a:cs typeface="Courier New" panose="02070309020205020404" pitchFamily="49" charset="0"/>
-              </a:rPr>
-              <a:t>1</a:t>
-            </a:r>
-          </a:p>
-          <a:p>
-            <a:r>
-              <a:rPr lang="en-US" dirty="0">
-                <a:latin typeface="Courier New" panose="02070309020205020404" pitchFamily="49" charset="0"/>
-                <a:cs typeface="Courier New" panose="02070309020205020404" pitchFamily="49" charset="0"/>
-              </a:rPr>
-              <a:t>9</a:t>
-            </a:r>
-          </a:p>
-          <a:p>
-            <a:r>
-              <a:rPr lang="en-US" dirty="0">
-                <a:latin typeface="Courier New" panose="02070309020205020404" pitchFamily="49" charset="0"/>
-                <a:cs typeface="Courier New" panose="02070309020205020404" pitchFamily="49" charset="0"/>
-              </a:rPr>
-              <a:t>3</a:t>
-            </a:r>
-          </a:p>
-          <a:p>
-            <a:r>
-              <a:rPr lang="en-US" b="1" dirty="0">
-                <a:latin typeface="Courier New" panose="02070309020205020404" pitchFamily="49" charset="0"/>
-                <a:cs typeface="Courier New" panose="02070309020205020404" pitchFamily="49" charset="0"/>
-              </a:rPr>
-              <a:t>3.5</a:t>
-            </a:r>
-            <a:endParaRPr lang="en-NL" b="1" dirty="0">
-              <a:latin typeface="Courier New" panose="02070309020205020404" pitchFamily="49" charset="0"/>
-              <a:cs typeface="Courier New" panose="02070309020205020404" pitchFamily="49" charset="0"/>
-            </a:endParaRPr>
-          </a:p>
-        </p:txBody>
-      </p:sp>
     </p:spTree>
     <p:extLst>
       <p:ext uri="{BB962C8B-B14F-4D97-AF65-F5344CB8AC3E}">
-        <p14:creationId xmlns:p14="http://schemas.microsoft.com/office/powerpoint/2010/main" val="2268189242"/>
+        <p14:creationId xmlns:p14="http://schemas.microsoft.com/office/powerpoint/2010/main" val="2190608810"/>
       </p:ext>
     </p:extLst>
   </p:cSld>
@@ -22323,7 +21890,7 @@
           <a:p>
             <a:r>
               <a:rPr lang="nl-NL" sz="3600" noProof="0" dirty="0"/>
-              <a:t>Overzicht ML landschap</a:t>
+              <a:t>Overzicht frameworks</a:t>
             </a:r>
           </a:p>
         </p:txBody>
@@ -30214,7 +29781,7 @@
           <a:p>
             <a:r>
               <a:rPr lang="nl-NL" sz="3600" noProof="0" dirty="0"/>
-              <a:t>Overzicht ML landschap</a:t>
+              <a:t>Overzicht frameworks</a:t>
             </a:r>
           </a:p>
         </p:txBody>
@@ -31080,7 +30647,7 @@
           <a:p>
             <a:r>
               <a:rPr lang="nl-NL" sz="3600" dirty="0"/>
-              <a:t>Wekwijze </a:t>
+              <a:t>Werkwijze </a:t>
             </a:r>
             <a:r>
               <a:rPr lang="nl-NL" sz="3600" noProof="0" dirty="0"/>
@@ -31337,15 +30904,7 @@
           <a:p>
             <a:r>
               <a:rPr lang="nl-NL" sz="3600" noProof="0" dirty="0"/>
-              <a:t>Opzet </a:t>
-            </a:r>
-            <a:r>
-              <a:rPr lang="nl-NL" sz="3600" noProof="0" dirty="0" err="1"/>
-              <a:t>scikit-learn</a:t>
-            </a:r>
-            <a:r>
-              <a:rPr lang="nl-NL" sz="3600" noProof="0" dirty="0"/>
-              <a:t> API</a:t>
+              <a:t>Modules scikit-learn API</a:t>
             </a:r>
           </a:p>
         </p:txBody>

</xml_diff>

<commit_message>
Update Python part 4
</commit_message>
<xml_diff>
--- a/python_course/4_scikit_learn/python_cursus_4.pptx
+++ b/python_course/4_scikit_learn/python_cursus_4.pptx
@@ -1154,7 +1154,7 @@
           <a:p>
             <a:fld id="{6F54D322-06CD-4C3F-9549-759BC5FDB94E}" type="datetimeFigureOut">
               <a:rPr lang="nl-NL" smtClean="0"/>
-              <a:t>10-9-2024</a:t>
+              <a:t>16-9-2024</a:t>
             </a:fld>
             <a:endParaRPr lang="nl-NL"/>
           </a:p>
@@ -1468,9 +1468,9 @@
           <a:p>
             <a:r>
               <a:rPr lang="en-US" dirty="0"/>
-              <a:t>1_transformers.ipynb</a:t>
-            </a:r>
-            <a:endParaRPr lang="nl-NL" dirty="0"/>
+              <a:t>Notebook: 1_transformers</a:t>
+            </a:r>
+            <a:endParaRPr lang="en-NL" dirty="0"/>
           </a:p>
         </p:txBody>
       </p:sp>
@@ -1491,7 +1491,7 @@
           <a:p>
             <a:fld id="{E65DFEEA-F20E-4282-B486-E48C3273787F}" type="slidenum">
               <a:rPr lang="nl-NL" smtClean="0"/>
-              <a:t>16</a:t>
+              <a:t>15</a:t>
             </a:fld>
             <a:endParaRPr lang="nl-NL"/>
           </a:p>
@@ -1500,7 +1500,7 @@
     </p:spTree>
     <p:extLst>
       <p:ext uri="{BB962C8B-B14F-4D97-AF65-F5344CB8AC3E}">
-        <p14:creationId xmlns:p14="http://schemas.microsoft.com/office/powerpoint/2010/main" val="346737877"/>
+        <p14:creationId xmlns:p14="http://schemas.microsoft.com/office/powerpoint/2010/main" val="2326409297"/>
       </p:ext>
     </p:extLst>
   </p:cSld>
@@ -1556,7 +1556,7 @@
           <a:p>
             <a:r>
               <a:rPr lang="en-US" dirty="0"/>
-              <a:t>2_modelling.ipynb</a:t>
+              <a:t>1_transformers.ipynb</a:t>
             </a:r>
             <a:endParaRPr lang="nl-NL" dirty="0"/>
           </a:p>
@@ -1579,6 +1579,94 @@
           <a:p>
             <a:fld id="{E65DFEEA-F20E-4282-B486-E48C3273787F}" type="slidenum">
               <a:rPr lang="nl-NL" smtClean="0"/>
+              <a:t>16</a:t>
+            </a:fld>
+            <a:endParaRPr lang="nl-NL"/>
+          </a:p>
+        </p:txBody>
+      </p:sp>
+    </p:spTree>
+    <p:extLst>
+      <p:ext uri="{BB962C8B-B14F-4D97-AF65-F5344CB8AC3E}">
+        <p14:creationId xmlns:p14="http://schemas.microsoft.com/office/powerpoint/2010/main" val="346737877"/>
+      </p:ext>
+    </p:extLst>
+  </p:cSld>
+  <p:clrMapOvr>
+    <a:masterClrMapping/>
+  </p:clrMapOvr>
+</p:notes>
+</file>
+
+<file path=ppt/notesSlides/notesSlide3.xml><?xml version="1.0" encoding="utf-8"?>
+<p:notes xmlns:a="http://schemas.openxmlformats.org/drawingml/2006/main" xmlns:r="http://schemas.openxmlformats.org/officeDocument/2006/relationships" xmlns:p="http://schemas.openxmlformats.org/presentationml/2006/main">
+  <p:cSld>
+    <p:spTree>
+      <p:nvGrpSpPr>
+        <p:cNvPr id="1" name=""/>
+        <p:cNvGrpSpPr/>
+        <p:nvPr/>
+      </p:nvGrpSpPr>
+      <p:grpSpPr>
+        <a:xfrm>
+          <a:off x="0" y="0"/>
+          <a:ext cx="0" cy="0"/>
+          <a:chOff x="0" y="0"/>
+          <a:chExt cx="0" cy="0"/>
+        </a:xfrm>
+      </p:grpSpPr>
+      <p:sp>
+        <p:nvSpPr>
+          <p:cNvPr id="2" name="Slide Image Placeholder 1"/>
+          <p:cNvSpPr>
+            <a:spLocks noGrp="1" noRot="1" noChangeAspect="1"/>
+          </p:cNvSpPr>
+          <p:nvPr>
+            <p:ph type="sldImg"/>
+          </p:nvPr>
+        </p:nvSpPr>
+        <p:spPr/>
+      </p:sp>
+      <p:sp>
+        <p:nvSpPr>
+          <p:cNvPr id="3" name="Notes Placeholder 2"/>
+          <p:cNvSpPr>
+            <a:spLocks noGrp="1"/>
+          </p:cNvSpPr>
+          <p:nvPr>
+            <p:ph type="body" idx="1"/>
+          </p:nvPr>
+        </p:nvSpPr>
+        <p:spPr/>
+        <p:txBody>
+          <a:bodyPr/>
+          <a:lstStyle/>
+          <a:p>
+            <a:r>
+              <a:rPr lang="en-US" dirty="0"/>
+              <a:t>2_modelling.ipynb</a:t>
+            </a:r>
+            <a:endParaRPr lang="nl-NL" dirty="0"/>
+          </a:p>
+        </p:txBody>
+      </p:sp>
+      <p:sp>
+        <p:nvSpPr>
+          <p:cNvPr id="4" name="Slide Number Placeholder 3"/>
+          <p:cNvSpPr>
+            <a:spLocks noGrp="1"/>
+          </p:cNvSpPr>
+          <p:nvPr>
+            <p:ph type="sldNum" sz="quarter" idx="5"/>
+          </p:nvPr>
+        </p:nvSpPr>
+        <p:spPr/>
+        <p:txBody>
+          <a:bodyPr/>
+          <a:lstStyle/>
+          <a:p>
+            <a:fld id="{E65DFEEA-F20E-4282-B486-E48C3273787F}" type="slidenum">
+              <a:rPr lang="nl-NL" smtClean="0"/>
               <a:t>24</a:t>
             </a:fld>
             <a:endParaRPr lang="nl-NL"/>
@@ -1598,7 +1686,7 @@
 </p:notes>
 </file>
 
-<file path=ppt/notesSlides/notesSlide3.xml><?xml version="1.0" encoding="utf-8"?>
+<file path=ppt/notesSlides/notesSlide4.xml><?xml version="1.0" encoding="utf-8"?>
 <p:notes xmlns:a="http://schemas.openxmlformats.org/drawingml/2006/main" xmlns:r="http://schemas.openxmlformats.org/officeDocument/2006/relationships" xmlns:p="http://schemas.openxmlformats.org/presentationml/2006/main">
   <p:cSld>
     <p:spTree>
@@ -1835,7 +1923,7 @@
           <a:p>
             <a:fld id="{5E9D55AD-DA6B-4A9D-BFE6-D0A1673E6EA9}" type="datetimeFigureOut">
               <a:rPr lang="en-NL" smtClean="0"/>
-              <a:t>10/09/2024</a:t>
+              <a:t>16/09/2024</a:t>
             </a:fld>
             <a:endParaRPr lang="en-NL"/>
           </a:p>
@@ -2035,7 +2123,7 @@
           <a:p>
             <a:fld id="{5E9D55AD-DA6B-4A9D-BFE6-D0A1673E6EA9}" type="datetimeFigureOut">
               <a:rPr lang="en-NL" smtClean="0"/>
-              <a:t>10/09/2024</a:t>
+              <a:t>16/09/2024</a:t>
             </a:fld>
             <a:endParaRPr lang="en-NL"/>
           </a:p>
@@ -2245,7 +2333,7 @@
           <a:p>
             <a:fld id="{5E9D55AD-DA6B-4A9D-BFE6-D0A1673E6EA9}" type="datetimeFigureOut">
               <a:rPr lang="en-NL" smtClean="0"/>
-              <a:t>10/09/2024</a:t>
+              <a:t>16/09/2024</a:t>
             </a:fld>
             <a:endParaRPr lang="en-NL"/>
           </a:p>
@@ -2445,7 +2533,7 @@
           <a:p>
             <a:fld id="{5E9D55AD-DA6B-4A9D-BFE6-D0A1673E6EA9}" type="datetimeFigureOut">
               <a:rPr lang="en-NL" smtClean="0"/>
-              <a:t>10/09/2024</a:t>
+              <a:t>16/09/2024</a:t>
             </a:fld>
             <a:endParaRPr lang="en-NL"/>
           </a:p>
@@ -2721,7 +2809,7 @@
           <a:p>
             <a:fld id="{5E9D55AD-DA6B-4A9D-BFE6-D0A1673E6EA9}" type="datetimeFigureOut">
               <a:rPr lang="en-NL" smtClean="0"/>
-              <a:t>10/09/2024</a:t>
+              <a:t>16/09/2024</a:t>
             </a:fld>
             <a:endParaRPr lang="en-NL"/>
           </a:p>
@@ -2989,7 +3077,7 @@
           <a:p>
             <a:fld id="{5E9D55AD-DA6B-4A9D-BFE6-D0A1673E6EA9}" type="datetimeFigureOut">
               <a:rPr lang="en-NL" smtClean="0"/>
-              <a:t>10/09/2024</a:t>
+              <a:t>16/09/2024</a:t>
             </a:fld>
             <a:endParaRPr lang="en-NL"/>
           </a:p>
@@ -3404,7 +3492,7 @@
           <a:p>
             <a:fld id="{5E9D55AD-DA6B-4A9D-BFE6-D0A1673E6EA9}" type="datetimeFigureOut">
               <a:rPr lang="en-NL" smtClean="0"/>
-              <a:t>10/09/2024</a:t>
+              <a:t>16/09/2024</a:t>
             </a:fld>
             <a:endParaRPr lang="en-NL"/>
           </a:p>
@@ -3546,7 +3634,7 @@
           <a:p>
             <a:fld id="{5E9D55AD-DA6B-4A9D-BFE6-D0A1673E6EA9}" type="datetimeFigureOut">
               <a:rPr lang="en-NL" smtClean="0"/>
-              <a:t>10/09/2024</a:t>
+              <a:t>16/09/2024</a:t>
             </a:fld>
             <a:endParaRPr lang="en-NL"/>
           </a:p>
@@ -3659,7 +3747,7 @@
           <a:p>
             <a:fld id="{5E9D55AD-DA6B-4A9D-BFE6-D0A1673E6EA9}" type="datetimeFigureOut">
               <a:rPr lang="en-NL" smtClean="0"/>
-              <a:t>10/09/2024</a:t>
+              <a:t>16/09/2024</a:t>
             </a:fld>
             <a:endParaRPr lang="en-NL"/>
           </a:p>
@@ -3972,7 +4060,7 @@
           <a:p>
             <a:fld id="{5E9D55AD-DA6B-4A9D-BFE6-D0A1673E6EA9}" type="datetimeFigureOut">
               <a:rPr lang="en-NL" smtClean="0"/>
-              <a:t>10/09/2024</a:t>
+              <a:t>16/09/2024</a:t>
             </a:fld>
             <a:endParaRPr lang="en-NL"/>
           </a:p>
@@ -4261,7 +4349,7 @@
           <a:p>
             <a:fld id="{5E9D55AD-DA6B-4A9D-BFE6-D0A1673E6EA9}" type="datetimeFigureOut">
               <a:rPr lang="en-NL" smtClean="0"/>
-              <a:t>10/09/2024</a:t>
+              <a:t>16/09/2024</a:t>
             </a:fld>
             <a:endParaRPr lang="en-NL"/>
           </a:p>
@@ -4504,7 +4592,7 @@
           <a:p>
             <a:fld id="{5E9D55AD-DA6B-4A9D-BFE6-D0A1673E6EA9}" type="datetimeFigureOut">
               <a:rPr lang="en-NL" smtClean="0"/>
-              <a:t>10/09/2024</a:t>
+              <a:t>16/09/2024</a:t>
             </a:fld>
             <a:endParaRPr lang="en-NL"/>
           </a:p>
@@ -7303,8 +7391,12 @@
           <a:lstStyle/>
           <a:p>
             <a:r>
+              <a:rPr lang="nl-NL" sz="3600" noProof="0" dirty="0" err="1"/>
+              <a:t>Transformers</a:t>
+            </a:r>
+            <a:r>
               <a:rPr lang="nl-NL" sz="3600" noProof="0" dirty="0"/>
-              <a:t>Transformaties in </a:t>
+              <a:t> in </a:t>
             </a:r>
             <a:r>
               <a:rPr lang="nl-NL" sz="3600" noProof="0" dirty="0" err="1"/>
@@ -7680,8 +7772,12 @@
           <a:lstStyle/>
           <a:p>
             <a:r>
+              <a:rPr lang="nl-NL" sz="3600" noProof="0" dirty="0" err="1"/>
+              <a:t>Transformers</a:t>
+            </a:r>
+            <a:r>
               <a:rPr lang="nl-NL" sz="3600" noProof="0" dirty="0"/>
-              <a:t>Transformaties in </a:t>
+              <a:t> in </a:t>
             </a:r>
             <a:r>
               <a:rPr lang="nl-NL" sz="3600" noProof="0" dirty="0" err="1"/>
@@ -8296,8 +8392,12 @@
           <a:lstStyle/>
           <a:p>
             <a:r>
+              <a:rPr lang="nl-NL" sz="3600" noProof="0" dirty="0" err="1"/>
+              <a:t>Transformers</a:t>
+            </a:r>
+            <a:r>
               <a:rPr lang="nl-NL" sz="3600" noProof="0" dirty="0"/>
-              <a:t>Transformaties in </a:t>
+              <a:t> in </a:t>
             </a:r>
             <a:r>
               <a:rPr lang="nl-NL" sz="3600" noProof="0" dirty="0" err="1"/>

</xml_diff>

<commit_message>
Update Python part 4 slides
</commit_message>
<xml_diff>
--- a/python_course/4_scikit_learn/python_cursus_4.pptx
+++ b/python_course/4_scikit_learn/python_cursus_4.pptx
@@ -40,7 +40,7 @@
     <p:sldId id="391" r:id="rId31"/>
     <p:sldId id="392" r:id="rId32"/>
     <p:sldId id="390" r:id="rId33"/>
-    <p:sldId id="359" r:id="rId34"/>
+    <p:sldId id="395" r:id="rId34"/>
     <p:sldId id="383" r:id="rId35"/>
     <p:sldId id="362" r:id="rId36"/>
     <p:sldId id="385" r:id="rId37"/>
@@ -1154,7 +1154,7 @@
           <a:p>
             <a:fld id="{6F54D322-06CD-4C3F-9549-759BC5FDB94E}" type="datetimeFigureOut">
               <a:rPr lang="nl-NL" smtClean="0"/>
-              <a:t>18-9-2024</a:t>
+              <a:t>1-10-2024</a:t>
             </a:fld>
             <a:endParaRPr lang="nl-NL"/>
           </a:p>
@@ -1923,7 +1923,7 @@
           <a:p>
             <a:fld id="{5E9D55AD-DA6B-4A9D-BFE6-D0A1673E6EA9}" type="datetimeFigureOut">
               <a:rPr lang="en-NL" smtClean="0"/>
-              <a:t>18/09/2024</a:t>
+              <a:t>01/10/2024</a:t>
             </a:fld>
             <a:endParaRPr lang="en-NL"/>
           </a:p>
@@ -2123,7 +2123,7 @@
           <a:p>
             <a:fld id="{5E9D55AD-DA6B-4A9D-BFE6-D0A1673E6EA9}" type="datetimeFigureOut">
               <a:rPr lang="en-NL" smtClean="0"/>
-              <a:t>18/09/2024</a:t>
+              <a:t>01/10/2024</a:t>
             </a:fld>
             <a:endParaRPr lang="en-NL"/>
           </a:p>
@@ -2333,7 +2333,7 @@
           <a:p>
             <a:fld id="{5E9D55AD-DA6B-4A9D-BFE6-D0A1673E6EA9}" type="datetimeFigureOut">
               <a:rPr lang="en-NL" smtClean="0"/>
-              <a:t>18/09/2024</a:t>
+              <a:t>01/10/2024</a:t>
             </a:fld>
             <a:endParaRPr lang="en-NL"/>
           </a:p>
@@ -2533,7 +2533,7 @@
           <a:p>
             <a:fld id="{5E9D55AD-DA6B-4A9D-BFE6-D0A1673E6EA9}" type="datetimeFigureOut">
               <a:rPr lang="en-NL" smtClean="0"/>
-              <a:t>18/09/2024</a:t>
+              <a:t>01/10/2024</a:t>
             </a:fld>
             <a:endParaRPr lang="en-NL"/>
           </a:p>
@@ -2809,7 +2809,7 @@
           <a:p>
             <a:fld id="{5E9D55AD-DA6B-4A9D-BFE6-D0A1673E6EA9}" type="datetimeFigureOut">
               <a:rPr lang="en-NL" smtClean="0"/>
-              <a:t>18/09/2024</a:t>
+              <a:t>01/10/2024</a:t>
             </a:fld>
             <a:endParaRPr lang="en-NL"/>
           </a:p>
@@ -3077,7 +3077,7 @@
           <a:p>
             <a:fld id="{5E9D55AD-DA6B-4A9D-BFE6-D0A1673E6EA9}" type="datetimeFigureOut">
               <a:rPr lang="en-NL" smtClean="0"/>
-              <a:t>18/09/2024</a:t>
+              <a:t>01/10/2024</a:t>
             </a:fld>
             <a:endParaRPr lang="en-NL"/>
           </a:p>
@@ -3492,7 +3492,7 @@
           <a:p>
             <a:fld id="{5E9D55AD-DA6B-4A9D-BFE6-D0A1673E6EA9}" type="datetimeFigureOut">
               <a:rPr lang="en-NL" smtClean="0"/>
-              <a:t>18/09/2024</a:t>
+              <a:t>01/10/2024</a:t>
             </a:fld>
             <a:endParaRPr lang="en-NL"/>
           </a:p>
@@ -3634,7 +3634,7 @@
           <a:p>
             <a:fld id="{5E9D55AD-DA6B-4A9D-BFE6-D0A1673E6EA9}" type="datetimeFigureOut">
               <a:rPr lang="en-NL" smtClean="0"/>
-              <a:t>18/09/2024</a:t>
+              <a:t>01/10/2024</a:t>
             </a:fld>
             <a:endParaRPr lang="en-NL"/>
           </a:p>
@@ -3747,7 +3747,7 @@
           <a:p>
             <a:fld id="{5E9D55AD-DA6B-4A9D-BFE6-D0A1673E6EA9}" type="datetimeFigureOut">
               <a:rPr lang="en-NL" smtClean="0"/>
-              <a:t>18/09/2024</a:t>
+              <a:t>01/10/2024</a:t>
             </a:fld>
             <a:endParaRPr lang="en-NL"/>
           </a:p>
@@ -4060,7 +4060,7 @@
           <a:p>
             <a:fld id="{5E9D55AD-DA6B-4A9D-BFE6-D0A1673E6EA9}" type="datetimeFigureOut">
               <a:rPr lang="en-NL" smtClean="0"/>
-              <a:t>18/09/2024</a:t>
+              <a:t>01/10/2024</a:t>
             </a:fld>
             <a:endParaRPr lang="en-NL"/>
           </a:p>
@@ -4349,7 +4349,7 @@
           <a:p>
             <a:fld id="{5E9D55AD-DA6B-4A9D-BFE6-D0A1673E6EA9}" type="datetimeFigureOut">
               <a:rPr lang="en-NL" smtClean="0"/>
-              <a:t>18/09/2024</a:t>
+              <a:t>01/10/2024</a:t>
             </a:fld>
             <a:endParaRPr lang="en-NL"/>
           </a:p>
@@ -4592,7 +4592,7 @@
           <a:p>
             <a:fld id="{5E9D55AD-DA6B-4A9D-BFE6-D0A1673E6EA9}" type="datetimeFigureOut">
               <a:rPr lang="en-NL" smtClean="0"/>
-              <a:t>18/09/2024</a:t>
+              <a:t>01/10/2024</a:t>
             </a:fld>
             <a:endParaRPr lang="en-NL"/>
           </a:p>
@@ -11368,17 +11368,6 @@
             </a:r>
           </a:p>
           <a:p>
-            <a:pPr lvl="1">
-              <a:spcAft>
-                <a:spcPts val="600"/>
-              </a:spcAft>
-            </a:pPr>
-            <a:r>
-              <a:rPr lang="nl-NL" sz="1600" dirty="0"/>
-              <a:t>Selecteren</a:t>
-            </a:r>
-          </a:p>
-          <a:p>
             <a:pPr>
               <a:spcAft>
                 <a:spcPts val="600"/>
@@ -14848,25 +14837,18 @@
               <a:t>exercises</a:t>
             </a:r>
             <a:r>
-              <a:rPr lang="nl-NL" sz="2000">
-                <a:latin typeface="Courier New" panose="02070309020205020404" pitchFamily="49" charset="0"/>
-                <a:cs typeface="Courier New" panose="02070309020205020404" pitchFamily="49" charset="0"/>
-              </a:rPr>
-              <a:t>/4_</a:t>
-            </a:r>
-            <a:r>
               <a:rPr lang="nl-NL" sz="2000" dirty="0">
                 <a:latin typeface="Courier New" panose="02070309020205020404" pitchFamily="49" charset="0"/>
                 <a:cs typeface="Courier New" panose="02070309020205020404" pitchFamily="49" charset="0"/>
               </a:rPr>
-              <a:t>modelling.ipynb</a:t>
+              <a:t>/4_modelling.ipynb</a:t>
             </a:r>
           </a:p>
           <a:p>
             <a:pPr marL="457200" lvl="1" indent="0">
               <a:buNone/>
             </a:pPr>
-            <a:endParaRPr lang="nl-NL" sz="1600" noProof="0" dirty="0"/>
+            <a:endParaRPr lang="nl-NL" sz="2000" noProof="0" dirty="0"/>
           </a:p>
           <a:p>
             <a:pPr marL="457200" indent="-457200">
@@ -14892,18 +14874,18 @@
           <a:p>
             <a:pPr lvl="1"/>
             <a:r>
-              <a:rPr lang="nl-NL" sz="1600" noProof="0" dirty="0"/>
+              <a:rPr lang="nl-NL" sz="2000" noProof="0" dirty="0"/>
               <a:t>Prepareer de data zodat deze geschikt is voor het model</a:t>
             </a:r>
             <a:r>
-              <a:rPr lang="nl-NL" sz="1600" dirty="0"/>
+              <a:rPr lang="nl-NL" sz="2000" dirty="0"/>
               <a:t>.</a:t>
             </a:r>
           </a:p>
           <a:p>
             <a:pPr lvl="1"/>
             <a:r>
-              <a:rPr lang="nl-NL" sz="1600" noProof="0" dirty="0"/>
+              <a:rPr lang="nl-NL" sz="2000" noProof="0" dirty="0"/>
               <a:t>Welke variabelen zijn belangrijk in het model?</a:t>
             </a:r>
           </a:p>
@@ -14945,25 +14927,25 @@
           <a:p>
             <a:pPr lvl="1"/>
             <a:r>
-              <a:rPr lang="nl-NL" sz="1600" noProof="0" dirty="0"/>
+              <a:rPr lang="nl-NL" sz="2000" noProof="0" dirty="0"/>
               <a:t>Over welke 10 records was het model het meest onzeker?</a:t>
             </a:r>
           </a:p>
           <a:p>
             <a:pPr lvl="1"/>
             <a:r>
-              <a:rPr lang="nl-NL" sz="1600" noProof="0" dirty="0"/>
+              <a:rPr lang="nl-NL" sz="2000" noProof="0" dirty="0"/>
               <a:t>Over welke records </a:t>
             </a:r>
             <a:r>
-              <a:rPr lang="nl-NL" sz="1600" noProof="0" dirty="0" err="1"/>
+              <a:rPr lang="nl-NL" sz="2000" noProof="0" dirty="0" err="1"/>
               <a:t>wa</a:t>
             </a:r>
             <a:r>
-              <a:rPr lang="nl-NL" sz="1600" dirty="0"/>
+              <a:rPr lang="nl-NL" sz="2000" dirty="0"/>
               <a:t>s het model heel zeker, maar klopte de voorspelling niet?</a:t>
             </a:r>
-            <a:endParaRPr lang="nl-NL" sz="1600" noProof="0" dirty="0"/>
+            <a:endParaRPr lang="nl-NL" sz="2000" noProof="0" dirty="0"/>
           </a:p>
         </p:txBody>
       </p:sp>
@@ -15344,7 +15326,7 @@
             </a:pPr>
             <a:r>
               <a:rPr lang="nl-NL" sz="1800" b="1" dirty="0"/>
-              <a:t>Categorische prestatiematen:</a:t>
+              <a:t>Categorisch doelvariabele:</a:t>
             </a:r>
           </a:p>
           <a:p>
@@ -15402,7 +15384,7 @@
             </a:pPr>
             <a:r>
               <a:rPr lang="nl-NL" sz="1800" b="1" dirty="0"/>
-              <a:t>Continue prestatiematen:</a:t>
+              <a:t>Continue doelvariabele:</a:t>
             </a:r>
           </a:p>
           <a:p>
@@ -15812,11 +15794,15 @@
           <a:p>
             <a:r>
               <a:rPr lang="nl-NL" sz="3600" noProof="0" dirty="0" err="1"/>
-              <a:t>Metrics</a:t>
+              <a:t>Validaren</a:t>
+            </a:r>
+            <a:r>
+              <a:rPr lang="nl-NL" sz="3600" noProof="0" dirty="0"/>
+              <a:t> met</a:t>
             </a:r>
             <a:r>
               <a:rPr lang="nl-NL" sz="3600" dirty="0"/>
-              <a:t> in </a:t>
+              <a:t> </a:t>
             </a:r>
             <a:r>
               <a:rPr lang="nl-NL" sz="3600" dirty="0" err="1"/>
@@ -16395,12 +16381,22 @@
           <a:p>
             <a:r>
               <a:rPr lang="en-US" sz="1400" dirty="0">
+                <a:solidFill>
+                  <a:schemeClr val="accent6">
+                    <a:lumMod val="75000"/>
+                  </a:schemeClr>
+                </a:solidFill>
                 <a:latin typeface="Courier New" panose="02070309020205020404" pitchFamily="49" charset="0"/>
                 <a:cs typeface="Courier New" panose="02070309020205020404" pitchFamily="49" charset="0"/>
               </a:rPr>
               <a:t># returns 0.5</a:t>
             </a:r>
             <a:endParaRPr lang="en-NL" sz="1400" dirty="0">
+              <a:solidFill>
+                <a:schemeClr val="accent6">
+                  <a:lumMod val="75000"/>
+                </a:schemeClr>
+              </a:solidFill>
               <a:latin typeface="Courier New" panose="02070309020205020404" pitchFamily="49" charset="0"/>
               <a:cs typeface="Courier New" panose="02070309020205020404" pitchFamily="49" charset="0"/>
             </a:endParaRPr>
@@ -16757,7 +16753,7 @@
           <a:p>
             <a:r>
               <a:rPr lang="nl-NL" sz="1800" dirty="0"/>
-              <a:t>Bij complex model kan optimalisatie doorschieten: </a:t>
+              <a:t>Bij complex model kan de optimalisatie doorschieten: </a:t>
             </a:r>
             <a:r>
               <a:rPr lang="nl-NL" sz="1800" u="sng" dirty="0" err="1"/>
@@ -16777,7 +16773,7 @@
           <a:p>
             <a:r>
               <a:rPr lang="nl-NL" sz="1800" dirty="0"/>
-              <a:t>Prestaties op train-data </a:t>
+              <a:t>Prestaties op trainingsdata zijn </a:t>
             </a:r>
             <a:r>
               <a:rPr lang="nl-NL" sz="1800" u="sng" dirty="0"/>
@@ -16785,7 +16781,7 @@
             </a:r>
             <a:r>
               <a:rPr lang="nl-NL" sz="1800" dirty="0"/>
-              <a:t> voor werkelijkheid!</a:t>
+              <a:t>!</a:t>
             </a:r>
           </a:p>
           <a:p>
@@ -16814,13 +16810,13 @@
             </a:r>
             <a:r>
               <a:rPr lang="nl-NL" sz="1800" dirty="0"/>
-              <a:t> gebruikt zijn bij het trainen van het model.</a:t>
+              <a:t> gebruikt zijn om het model te trainen.</a:t>
             </a:r>
           </a:p>
           <a:p>
             <a:r>
               <a:rPr lang="nl-NL" sz="1800" dirty="0"/>
-              <a:t>Het model kan zich niet aanpassen aan deze data.</a:t>
+              <a:t>Het model is niet geoptimaliseerd voor deze data.</a:t>
             </a:r>
           </a:p>
           <a:p>
@@ -17517,7 +17513,7 @@
             </a:pPr>
             <a:r>
               <a:rPr lang="nl-NL" sz="2000" dirty="0"/>
-              <a:t>Train dataset:		Gebruikt om model op te trainen.</a:t>
+              <a:t>Train:		Voor trainen van modellen.</a:t>
             </a:r>
           </a:p>
           <a:p>
@@ -17526,7 +17522,7 @@
             </a:pPr>
             <a:r>
               <a:rPr lang="nl-NL" sz="2000" dirty="0"/>
-              <a:t>Validatie dataset:		Gebruikt om modellen te vergelijken.</a:t>
+              <a:t>Validatie:	Voor vergelijken van modellen.</a:t>
             </a:r>
           </a:p>
           <a:p>
@@ -17535,7 +17531,7 @@
             </a:pPr>
             <a:r>
               <a:rPr lang="nl-NL" sz="2000" dirty="0"/>
-              <a:t>Test dataset:		Gebruikt voor accurate schatting prestaties.</a:t>
+              <a:t>Test:		Voor accurate schatting model prestaties.</a:t>
             </a:r>
           </a:p>
         </p:txBody>
@@ -18099,7 +18095,7 @@
             </a:pPr>
             <a:r>
               <a:rPr lang="nl-NL" sz="2000" dirty="0"/>
-              <a:t>Train dataset:		Gebruikt om model op te trainen.</a:t>
+              <a:t>Train:		Voor trainen van modellen.</a:t>
             </a:r>
           </a:p>
           <a:p>
@@ -18108,7 +18104,7 @@
             </a:pPr>
             <a:r>
               <a:rPr lang="nl-NL" sz="2000" dirty="0"/>
-              <a:t>Validatie dataset:		Gebruikt om modellen te vergelijken.</a:t>
+              <a:t>Validatie:	Voor vergelijken van modellen.</a:t>
             </a:r>
           </a:p>
           <a:p>
@@ -18117,7 +18113,7 @@
             </a:pPr>
             <a:r>
               <a:rPr lang="nl-NL" sz="2000" dirty="0"/>
-              <a:t>Test dataset:		Gebruikt voor accurate schatting prestaties.</a:t>
+              <a:t>Test:		Voor accurate schatting model prestaties.</a:t>
             </a:r>
           </a:p>
         </p:txBody>
@@ -18318,7 +18314,13 @@
           <p:cNvGraphicFramePr>
             <a:graphicFrameLocks noGrp="1"/>
           </p:cNvGraphicFramePr>
-          <p:nvPr/>
+          <p:nvPr>
+            <p:extLst>
+              <p:ext uri="{D42A27DB-BD31-4B8C-83A1-F6EECF244321}">
+                <p14:modId xmlns:p14="http://schemas.microsoft.com/office/powerpoint/2010/main" val="2739958825"/>
+              </p:ext>
+            </p:extLst>
+          </p:nvPr>
         </p:nvGraphicFramePr>
         <p:xfrm>
           <a:off x="990600" y="2765692"/>
@@ -18760,9 +18762,9 @@
                       <a:tailEnd type="none" w="med" len="med"/>
                     </a:lnT>
                     <a:solidFill>
-                      <a:schemeClr val="accent2">
-                        <a:lumMod val="60000"/>
-                        <a:lumOff val="40000"/>
+                      <a:schemeClr val="accent6">
+                        <a:lumMod val="40000"/>
+                        <a:lumOff val="60000"/>
                       </a:schemeClr>
                     </a:solidFill>
                   </a:tcPr>
@@ -18791,7 +18793,7 @@
                       <a:tailEnd type="none" w="med" len="med"/>
                     </a:lnT>
                     <a:solidFill>
-                      <a:schemeClr val="accent2">
+                      <a:schemeClr val="accent6">
                         <a:lumMod val="40000"/>
                         <a:lumOff val="60000"/>
                       </a:schemeClr>
@@ -18805,15 +18807,15 @@
                     <a:p>
                       <a:pPr algn="ctr"/>
                       <a:r>
-                        <a:rPr lang="en-US" dirty="0"/>
-                        <a:t>Test</a:t>
+                        <a:rPr lang="en-US" dirty="0" err="1"/>
+                        <a:t>Validatie</a:t>
                       </a:r>
                       <a:endParaRPr lang="en-NL" dirty="0"/>
                     </a:p>
                   </a:txBody>
                   <a:tcPr anchor="ctr">
                     <a:solidFill>
-                      <a:schemeClr val="accent5">
+                      <a:schemeClr val="accent2">
                         <a:lumMod val="60000"/>
                         <a:lumOff val="40000"/>
                       </a:schemeClr>
@@ -18924,7 +18926,7 @@
                   </a:txBody>
                   <a:tcPr anchor="ctr">
                     <a:solidFill>
-                      <a:schemeClr val="accent2">
+                      <a:schemeClr val="accent6">
                         <a:lumMod val="20000"/>
                         <a:lumOff val="80000"/>
                       </a:schemeClr>
@@ -18956,15 +18958,15 @@
                     <a:p>
                       <a:pPr algn="ctr"/>
                       <a:r>
-                        <a:rPr lang="en-US" dirty="0"/>
-                        <a:t>Test</a:t>
+                        <a:rPr lang="en-US" dirty="0" err="1"/>
+                        <a:t>Validatie</a:t>
                       </a:r>
                       <a:endParaRPr lang="en-NL" dirty="0"/>
                     </a:p>
                   </a:txBody>
                   <a:tcPr anchor="ctr">
                     <a:solidFill>
-                      <a:schemeClr val="accent5">
+                      <a:schemeClr val="accent2">
                         <a:lumMod val="60000"/>
                         <a:lumOff val="40000"/>
                       </a:schemeClr>
@@ -19057,7 +19059,7 @@
                   </a:txBody>
                   <a:tcPr anchor="ctr">
                     <a:solidFill>
-                      <a:schemeClr val="accent2">
+                      <a:schemeClr val="accent6">
                         <a:lumMod val="40000"/>
                         <a:lumOff val="60000"/>
                       </a:schemeClr>
@@ -19107,15 +19109,15 @@
                     <a:p>
                       <a:pPr algn="ctr"/>
                       <a:r>
-                        <a:rPr lang="en-US" dirty="0"/>
-                        <a:t>Test</a:t>
+                        <a:rPr lang="en-US" dirty="0" err="1"/>
+                        <a:t>Validatie</a:t>
                       </a:r>
                       <a:endParaRPr lang="en-NL" dirty="0"/>
                     </a:p>
                   </a:txBody>
                   <a:tcPr anchor="ctr">
                     <a:solidFill>
-                      <a:schemeClr val="accent5">
+                      <a:schemeClr val="accent2">
                         <a:lumMod val="60000"/>
                         <a:lumOff val="40000"/>
                       </a:schemeClr>
@@ -19190,7 +19192,7 @@
                   </a:txBody>
                   <a:tcPr anchor="ctr">
                     <a:solidFill>
-                      <a:schemeClr val="accent2">
+                      <a:schemeClr val="accent6">
                         <a:lumMod val="20000"/>
                         <a:lumOff val="80000"/>
                       </a:schemeClr>
@@ -19258,15 +19260,15 @@
                     <a:p>
                       <a:pPr algn="ctr"/>
                       <a:r>
-                        <a:rPr lang="en-US" dirty="0"/>
-                        <a:t>Test</a:t>
+                        <a:rPr lang="en-US" dirty="0" err="1"/>
+                        <a:t>Validatie</a:t>
                       </a:r>
                       <a:endParaRPr lang="en-NL" dirty="0"/>
                     </a:p>
                   </a:txBody>
                   <a:tcPr anchor="ctr">
                     <a:solidFill>
-                      <a:schemeClr val="accent5">
+                      <a:schemeClr val="accent2">
                         <a:lumMod val="60000"/>
                         <a:lumOff val="40000"/>
                       </a:schemeClr>
@@ -19323,7 +19325,7 @@
                   </a:txBody>
                   <a:tcPr anchor="ctr">
                     <a:solidFill>
-                      <a:schemeClr val="accent2">
+                      <a:schemeClr val="accent6">
                         <a:lumMod val="40000"/>
                         <a:lumOff val="60000"/>
                       </a:schemeClr>
@@ -19409,15 +19411,15 @@
                     <a:p>
                       <a:pPr algn="ctr"/>
                       <a:r>
-                        <a:rPr lang="en-US" dirty="0"/>
-                        <a:t>Test</a:t>
+                        <a:rPr lang="en-US" dirty="0" err="1"/>
+                        <a:t>Validatie</a:t>
                       </a:r>
                       <a:endParaRPr lang="en-NL" dirty="0"/>
                     </a:p>
                   </a:txBody>
                   <a:tcPr anchor="ctr">
                     <a:solidFill>
-                      <a:schemeClr val="accent5">
+                      <a:schemeClr val="accent2">
                         <a:lumMod val="60000"/>
                         <a:lumOff val="40000"/>
                       </a:schemeClr>
@@ -19685,10 +19687,10 @@
       </p:grpSpPr>
       <p:sp>
         <p:nvSpPr>
-          <p:cNvPr id="4" name="Title 3">
-            <a:extLst>
-              <a:ext uri="{FF2B5EF4-FFF2-40B4-BE49-F238E27FC236}">
-                <a16:creationId xmlns:a16="http://schemas.microsoft.com/office/drawing/2014/main" id="{72C925CA-BCA3-3701-E08E-95652380B32E}"/>
+          <p:cNvPr id="2" name="Title 1">
+            <a:extLst>
+              <a:ext uri="{FF2B5EF4-FFF2-40B4-BE49-F238E27FC236}">
+                <a16:creationId xmlns:a16="http://schemas.microsoft.com/office/drawing/2014/main" id="{39A1D606-8DD1-369C-5C09-471CDD551AD5}"/>
               </a:ext>
             </a:extLst>
           </p:cNvPr>
@@ -19699,47 +19701,622 @@
             <p:ph type="title"/>
           </p:nvPr>
         </p:nvSpPr>
-        <p:spPr/>
+        <p:spPr>
+          <a:xfrm>
+            <a:off x="838200" y="365126"/>
+            <a:ext cx="10515600" cy="718608"/>
+          </a:xfrm>
+        </p:spPr>
         <p:txBody>
-          <a:bodyPr/>
+          <a:bodyPr>
+            <a:normAutofit/>
+          </a:bodyPr>
           <a:lstStyle/>
           <a:p>
             <a:r>
-              <a:rPr lang="nl-NL" noProof="0" dirty="0"/>
-              <a:t>Selecteren</a:t>
-            </a:r>
+              <a:rPr lang="nl-NL" sz="3600" dirty="0"/>
+              <a:t>Cross-</a:t>
+            </a:r>
+            <a:r>
+              <a:rPr lang="nl-NL" sz="3600" dirty="0" err="1"/>
+              <a:t>validation</a:t>
+            </a:r>
+            <a:endParaRPr lang="nl-NL" sz="3600" noProof="0" dirty="0"/>
           </a:p>
         </p:txBody>
       </p:sp>
       <p:sp>
         <p:nvSpPr>
-          <p:cNvPr id="5" name="Text Placeholder 4">
-            <a:extLst>
-              <a:ext uri="{FF2B5EF4-FFF2-40B4-BE49-F238E27FC236}">
-                <a16:creationId xmlns:a16="http://schemas.microsoft.com/office/drawing/2014/main" id="{1AB31C95-91AF-DF13-FB58-0DA5F2D9F6F7}"/>
-              </a:ext>
-            </a:extLst>
-          </p:cNvPr>
-          <p:cNvSpPr>
-            <a:spLocks noGrp="1"/>
-          </p:cNvSpPr>
-          <p:nvPr>
-            <p:ph type="body" idx="1"/>
-          </p:nvPr>
+          <p:cNvPr id="4" name="TextBox 3">
+            <a:extLst>
+              <a:ext uri="{FF2B5EF4-FFF2-40B4-BE49-F238E27FC236}">
+                <a16:creationId xmlns:a16="http://schemas.microsoft.com/office/drawing/2014/main" id="{B47EA95A-6DDD-ED89-357A-943A5BC87A94}"/>
+              </a:ext>
+            </a:extLst>
+          </p:cNvPr>
+          <p:cNvSpPr txBox="1"/>
+          <p:nvPr/>
         </p:nvSpPr>
-        <p:spPr/>
+        <p:spPr>
+          <a:xfrm>
+            <a:off x="6555232" y="2530561"/>
+            <a:ext cx="184731" cy="369332"/>
+          </a:xfrm>
+          <a:prstGeom prst="rect">
+            <a:avLst/>
+          </a:prstGeom>
+          <a:noFill/>
+        </p:spPr>
         <p:txBody>
-          <a:bodyPr/>
+          <a:bodyPr wrap="none" rtlCol="0">
+            <a:spAutoFit/>
+          </a:bodyPr>
           <a:lstStyle/>
           <a:p>
-            <a:endParaRPr lang="en-NL"/>
+            <a:endParaRPr lang="en-NL" dirty="0"/>
           </a:p>
         </p:txBody>
       </p:sp>
+      <p:sp>
+        <p:nvSpPr>
+          <p:cNvPr id="5" name="Content Placeholder 2">
+            <a:extLst>
+              <a:ext uri="{FF2B5EF4-FFF2-40B4-BE49-F238E27FC236}">
+                <a16:creationId xmlns:a16="http://schemas.microsoft.com/office/drawing/2014/main" id="{C0C9B175-1295-12B2-9AD0-5C333CB73832}"/>
+              </a:ext>
+            </a:extLst>
+          </p:cNvPr>
+          <p:cNvSpPr txBox="1">
+            <a:spLocks/>
+          </p:cNvSpPr>
+          <p:nvPr/>
+        </p:nvSpPr>
+        <p:spPr>
+          <a:xfrm>
+            <a:off x="990601" y="1608667"/>
+            <a:ext cx="3785381" cy="4720696"/>
+          </a:xfrm>
+          <a:prstGeom prst="rect">
+            <a:avLst/>
+          </a:prstGeom>
+        </p:spPr>
+        <p:txBody>
+          <a:bodyPr vert="horz" lIns="91440" tIns="45720" rIns="91440" bIns="45720" rtlCol="0">
+            <a:normAutofit/>
+          </a:bodyPr>
+          <a:lstStyle>
+            <a:lvl1pPr marL="228600" indent="-228600" algn="l" defTabSz="914400" rtl="0" eaLnBrk="1" latinLnBrk="0" hangingPunct="1">
+              <a:lnSpc>
+                <a:spcPct val="90000"/>
+              </a:lnSpc>
+              <a:spcBef>
+                <a:spcPts val="1000"/>
+              </a:spcBef>
+              <a:buFont typeface="Arial" panose="020B0604020202020204" pitchFamily="34" charset="0"/>
+              <a:buChar char="•"/>
+              <a:defRPr sz="2800" kern="1200">
+                <a:solidFill>
+                  <a:schemeClr val="tx1"/>
+                </a:solidFill>
+                <a:latin typeface="+mn-lt"/>
+                <a:ea typeface="+mn-ea"/>
+                <a:cs typeface="+mn-cs"/>
+              </a:defRPr>
+            </a:lvl1pPr>
+            <a:lvl2pPr marL="685800" indent="-228600" algn="l" defTabSz="914400" rtl="0" eaLnBrk="1" latinLnBrk="0" hangingPunct="1">
+              <a:lnSpc>
+                <a:spcPct val="90000"/>
+              </a:lnSpc>
+              <a:spcBef>
+                <a:spcPts val="500"/>
+              </a:spcBef>
+              <a:buFont typeface="Arial" panose="020B0604020202020204" pitchFamily="34" charset="0"/>
+              <a:buChar char="•"/>
+              <a:defRPr sz="2400" kern="1200">
+                <a:solidFill>
+                  <a:schemeClr val="tx1"/>
+                </a:solidFill>
+                <a:latin typeface="+mn-lt"/>
+                <a:ea typeface="+mn-ea"/>
+                <a:cs typeface="+mn-cs"/>
+              </a:defRPr>
+            </a:lvl2pPr>
+            <a:lvl3pPr marL="1143000" indent="-228600" algn="l" defTabSz="914400" rtl="0" eaLnBrk="1" latinLnBrk="0" hangingPunct="1">
+              <a:lnSpc>
+                <a:spcPct val="90000"/>
+              </a:lnSpc>
+              <a:spcBef>
+                <a:spcPts val="500"/>
+              </a:spcBef>
+              <a:buFont typeface="Arial" panose="020B0604020202020204" pitchFamily="34" charset="0"/>
+              <a:buChar char="•"/>
+              <a:defRPr sz="2000" kern="1200">
+                <a:solidFill>
+                  <a:schemeClr val="tx1"/>
+                </a:solidFill>
+                <a:latin typeface="+mn-lt"/>
+                <a:ea typeface="+mn-ea"/>
+                <a:cs typeface="+mn-cs"/>
+              </a:defRPr>
+            </a:lvl3pPr>
+            <a:lvl4pPr marL="1600200" indent="-228600" algn="l" defTabSz="914400" rtl="0" eaLnBrk="1" latinLnBrk="0" hangingPunct="1">
+              <a:lnSpc>
+                <a:spcPct val="90000"/>
+              </a:lnSpc>
+              <a:spcBef>
+                <a:spcPts val="500"/>
+              </a:spcBef>
+              <a:buFont typeface="Arial" panose="020B0604020202020204" pitchFamily="34" charset="0"/>
+              <a:buChar char="•"/>
+              <a:defRPr sz="1800" kern="1200">
+                <a:solidFill>
+                  <a:schemeClr val="tx1"/>
+                </a:solidFill>
+                <a:latin typeface="+mn-lt"/>
+                <a:ea typeface="+mn-ea"/>
+                <a:cs typeface="+mn-cs"/>
+              </a:defRPr>
+            </a:lvl4pPr>
+            <a:lvl5pPr marL="2057400" indent="-228600" algn="l" defTabSz="914400" rtl="0" eaLnBrk="1" latinLnBrk="0" hangingPunct="1">
+              <a:lnSpc>
+                <a:spcPct val="90000"/>
+              </a:lnSpc>
+              <a:spcBef>
+                <a:spcPts val="500"/>
+              </a:spcBef>
+              <a:buFont typeface="Arial" panose="020B0604020202020204" pitchFamily="34" charset="0"/>
+              <a:buChar char="•"/>
+              <a:defRPr sz="1800" kern="1200">
+                <a:solidFill>
+                  <a:schemeClr val="tx1"/>
+                </a:solidFill>
+                <a:latin typeface="+mn-lt"/>
+                <a:ea typeface="+mn-ea"/>
+                <a:cs typeface="+mn-cs"/>
+              </a:defRPr>
+            </a:lvl5pPr>
+            <a:lvl6pPr marL="2514600" indent="-228600" algn="l" defTabSz="914400" rtl="0" eaLnBrk="1" latinLnBrk="0" hangingPunct="1">
+              <a:lnSpc>
+                <a:spcPct val="90000"/>
+              </a:lnSpc>
+              <a:spcBef>
+                <a:spcPts val="500"/>
+              </a:spcBef>
+              <a:buFont typeface="Arial" panose="020B0604020202020204" pitchFamily="34" charset="0"/>
+              <a:buChar char="•"/>
+              <a:defRPr sz="1800" kern="1200">
+                <a:solidFill>
+                  <a:schemeClr val="tx1"/>
+                </a:solidFill>
+                <a:latin typeface="+mn-lt"/>
+                <a:ea typeface="+mn-ea"/>
+                <a:cs typeface="+mn-cs"/>
+              </a:defRPr>
+            </a:lvl6pPr>
+            <a:lvl7pPr marL="2971800" indent="-228600" algn="l" defTabSz="914400" rtl="0" eaLnBrk="1" latinLnBrk="0" hangingPunct="1">
+              <a:lnSpc>
+                <a:spcPct val="90000"/>
+              </a:lnSpc>
+              <a:spcBef>
+                <a:spcPts val="500"/>
+              </a:spcBef>
+              <a:buFont typeface="Arial" panose="020B0604020202020204" pitchFamily="34" charset="0"/>
+              <a:buChar char="•"/>
+              <a:defRPr sz="1800" kern="1200">
+                <a:solidFill>
+                  <a:schemeClr val="tx1"/>
+                </a:solidFill>
+                <a:latin typeface="+mn-lt"/>
+                <a:ea typeface="+mn-ea"/>
+                <a:cs typeface="+mn-cs"/>
+              </a:defRPr>
+            </a:lvl7pPr>
+            <a:lvl8pPr marL="3429000" indent="-228600" algn="l" defTabSz="914400" rtl="0" eaLnBrk="1" latinLnBrk="0" hangingPunct="1">
+              <a:lnSpc>
+                <a:spcPct val="90000"/>
+              </a:lnSpc>
+              <a:spcBef>
+                <a:spcPts val="500"/>
+              </a:spcBef>
+              <a:buFont typeface="Arial" panose="020B0604020202020204" pitchFamily="34" charset="0"/>
+              <a:buChar char="•"/>
+              <a:defRPr sz="1800" kern="1200">
+                <a:solidFill>
+                  <a:schemeClr val="tx1"/>
+                </a:solidFill>
+                <a:latin typeface="+mn-lt"/>
+                <a:ea typeface="+mn-ea"/>
+                <a:cs typeface="+mn-cs"/>
+              </a:defRPr>
+            </a:lvl8pPr>
+            <a:lvl9pPr marL="3886200" indent="-228600" algn="l" defTabSz="914400" rtl="0" eaLnBrk="1" latinLnBrk="0" hangingPunct="1">
+              <a:lnSpc>
+                <a:spcPct val="90000"/>
+              </a:lnSpc>
+              <a:spcBef>
+                <a:spcPts val="500"/>
+              </a:spcBef>
+              <a:buFont typeface="Arial" panose="020B0604020202020204" pitchFamily="34" charset="0"/>
+              <a:buChar char="•"/>
+              <a:defRPr sz="1800" kern="1200">
+                <a:solidFill>
+                  <a:schemeClr val="tx1"/>
+                </a:solidFill>
+                <a:latin typeface="+mn-lt"/>
+                <a:ea typeface="+mn-ea"/>
+                <a:cs typeface="+mn-cs"/>
+              </a:defRPr>
+            </a:lvl9pPr>
+          </a:lstStyle>
+          <a:p>
+            <a:pPr marL="0" indent="0">
+              <a:buNone/>
+            </a:pPr>
+            <a:r>
+              <a:rPr lang="nl-NL" sz="2000" b="1" dirty="0"/>
+              <a:t>Klein aantal splits</a:t>
+            </a:r>
+          </a:p>
+          <a:p>
+            <a:pPr marL="0" indent="0">
+              <a:buNone/>
+            </a:pPr>
+            <a:endParaRPr lang="nl-NL" sz="2000" dirty="0"/>
+          </a:p>
+          <a:p>
+            <a:pPr marL="0" indent="0">
+              <a:buNone/>
+            </a:pPr>
+            <a:r>
+              <a:rPr lang="nl-NL" sz="2000" u="sng" dirty="0"/>
+              <a:t>Kleine training sets</a:t>
+            </a:r>
+          </a:p>
+          <a:p>
+            <a:pPr marL="0" indent="0">
+              <a:buNone/>
+            </a:pPr>
+            <a:r>
+              <a:rPr lang="nl-NL" sz="2000" dirty="0"/>
+              <a:t>Model kan minder goed leren en presteert slechter dan je mag verwachten in de praktijk.</a:t>
+            </a:r>
+          </a:p>
+          <a:p>
+            <a:pPr marL="0" indent="0">
+              <a:buNone/>
+            </a:pPr>
+            <a:endParaRPr lang="nl-NL" sz="2000" dirty="0"/>
+          </a:p>
+          <a:p>
+            <a:pPr marL="0" indent="0">
+              <a:buNone/>
+            </a:pPr>
+            <a:endParaRPr lang="nl-NL" sz="2000" dirty="0"/>
+          </a:p>
+          <a:p>
+            <a:pPr marL="0" indent="0">
+              <a:buNone/>
+            </a:pPr>
+            <a:r>
+              <a:rPr lang="nl-NL" sz="2000" u="sng" dirty="0"/>
+              <a:t>Grote validatie sets</a:t>
+            </a:r>
+          </a:p>
+          <a:p>
+            <a:pPr marL="0" indent="0">
+              <a:buNone/>
+            </a:pPr>
+            <a:r>
+              <a:rPr lang="nl-NL" sz="2000" dirty="0"/>
+              <a:t>Meer cases, foutmarges nauwkeuriger gemeten.</a:t>
+            </a:r>
+          </a:p>
+        </p:txBody>
+      </p:sp>
+      <p:sp>
+        <p:nvSpPr>
+          <p:cNvPr id="6" name="Content Placeholder 2">
+            <a:extLst>
+              <a:ext uri="{FF2B5EF4-FFF2-40B4-BE49-F238E27FC236}">
+                <a16:creationId xmlns:a16="http://schemas.microsoft.com/office/drawing/2014/main" id="{C998869E-8D0A-796B-BD33-9FF132A8B1B4}"/>
+              </a:ext>
+            </a:extLst>
+          </p:cNvPr>
+          <p:cNvSpPr txBox="1">
+            <a:spLocks/>
+          </p:cNvSpPr>
+          <p:nvPr/>
+        </p:nvSpPr>
+        <p:spPr>
+          <a:xfrm>
+            <a:off x="7416018" y="1608667"/>
+            <a:ext cx="3785381" cy="4720696"/>
+          </a:xfrm>
+          <a:prstGeom prst="rect">
+            <a:avLst/>
+          </a:prstGeom>
+        </p:spPr>
+        <p:txBody>
+          <a:bodyPr vert="horz" lIns="91440" tIns="45720" rIns="91440" bIns="45720" rtlCol="0">
+            <a:normAutofit/>
+          </a:bodyPr>
+          <a:lstStyle>
+            <a:lvl1pPr marL="228600" indent="-228600" algn="l" defTabSz="914400" rtl="0" eaLnBrk="1" latinLnBrk="0" hangingPunct="1">
+              <a:lnSpc>
+                <a:spcPct val="90000"/>
+              </a:lnSpc>
+              <a:spcBef>
+                <a:spcPts val="1000"/>
+              </a:spcBef>
+              <a:buFont typeface="Arial" panose="020B0604020202020204" pitchFamily="34" charset="0"/>
+              <a:buChar char="•"/>
+              <a:defRPr sz="2800" kern="1200">
+                <a:solidFill>
+                  <a:schemeClr val="tx1"/>
+                </a:solidFill>
+                <a:latin typeface="+mn-lt"/>
+                <a:ea typeface="+mn-ea"/>
+                <a:cs typeface="+mn-cs"/>
+              </a:defRPr>
+            </a:lvl1pPr>
+            <a:lvl2pPr marL="685800" indent="-228600" algn="l" defTabSz="914400" rtl="0" eaLnBrk="1" latinLnBrk="0" hangingPunct="1">
+              <a:lnSpc>
+                <a:spcPct val="90000"/>
+              </a:lnSpc>
+              <a:spcBef>
+                <a:spcPts val="500"/>
+              </a:spcBef>
+              <a:buFont typeface="Arial" panose="020B0604020202020204" pitchFamily="34" charset="0"/>
+              <a:buChar char="•"/>
+              <a:defRPr sz="2400" kern="1200">
+                <a:solidFill>
+                  <a:schemeClr val="tx1"/>
+                </a:solidFill>
+                <a:latin typeface="+mn-lt"/>
+                <a:ea typeface="+mn-ea"/>
+                <a:cs typeface="+mn-cs"/>
+              </a:defRPr>
+            </a:lvl2pPr>
+            <a:lvl3pPr marL="1143000" indent="-228600" algn="l" defTabSz="914400" rtl="0" eaLnBrk="1" latinLnBrk="0" hangingPunct="1">
+              <a:lnSpc>
+                <a:spcPct val="90000"/>
+              </a:lnSpc>
+              <a:spcBef>
+                <a:spcPts val="500"/>
+              </a:spcBef>
+              <a:buFont typeface="Arial" panose="020B0604020202020204" pitchFamily="34" charset="0"/>
+              <a:buChar char="•"/>
+              <a:defRPr sz="2000" kern="1200">
+                <a:solidFill>
+                  <a:schemeClr val="tx1"/>
+                </a:solidFill>
+                <a:latin typeface="+mn-lt"/>
+                <a:ea typeface="+mn-ea"/>
+                <a:cs typeface="+mn-cs"/>
+              </a:defRPr>
+            </a:lvl3pPr>
+            <a:lvl4pPr marL="1600200" indent="-228600" algn="l" defTabSz="914400" rtl="0" eaLnBrk="1" latinLnBrk="0" hangingPunct="1">
+              <a:lnSpc>
+                <a:spcPct val="90000"/>
+              </a:lnSpc>
+              <a:spcBef>
+                <a:spcPts val="500"/>
+              </a:spcBef>
+              <a:buFont typeface="Arial" panose="020B0604020202020204" pitchFamily="34" charset="0"/>
+              <a:buChar char="•"/>
+              <a:defRPr sz="1800" kern="1200">
+                <a:solidFill>
+                  <a:schemeClr val="tx1"/>
+                </a:solidFill>
+                <a:latin typeface="+mn-lt"/>
+                <a:ea typeface="+mn-ea"/>
+                <a:cs typeface="+mn-cs"/>
+              </a:defRPr>
+            </a:lvl4pPr>
+            <a:lvl5pPr marL="2057400" indent="-228600" algn="l" defTabSz="914400" rtl="0" eaLnBrk="1" latinLnBrk="0" hangingPunct="1">
+              <a:lnSpc>
+                <a:spcPct val="90000"/>
+              </a:lnSpc>
+              <a:spcBef>
+                <a:spcPts val="500"/>
+              </a:spcBef>
+              <a:buFont typeface="Arial" panose="020B0604020202020204" pitchFamily="34" charset="0"/>
+              <a:buChar char="•"/>
+              <a:defRPr sz="1800" kern="1200">
+                <a:solidFill>
+                  <a:schemeClr val="tx1"/>
+                </a:solidFill>
+                <a:latin typeface="+mn-lt"/>
+                <a:ea typeface="+mn-ea"/>
+                <a:cs typeface="+mn-cs"/>
+              </a:defRPr>
+            </a:lvl5pPr>
+            <a:lvl6pPr marL="2514600" indent="-228600" algn="l" defTabSz="914400" rtl="0" eaLnBrk="1" latinLnBrk="0" hangingPunct="1">
+              <a:lnSpc>
+                <a:spcPct val="90000"/>
+              </a:lnSpc>
+              <a:spcBef>
+                <a:spcPts val="500"/>
+              </a:spcBef>
+              <a:buFont typeface="Arial" panose="020B0604020202020204" pitchFamily="34" charset="0"/>
+              <a:buChar char="•"/>
+              <a:defRPr sz="1800" kern="1200">
+                <a:solidFill>
+                  <a:schemeClr val="tx1"/>
+                </a:solidFill>
+                <a:latin typeface="+mn-lt"/>
+                <a:ea typeface="+mn-ea"/>
+                <a:cs typeface="+mn-cs"/>
+              </a:defRPr>
+            </a:lvl6pPr>
+            <a:lvl7pPr marL="2971800" indent="-228600" algn="l" defTabSz="914400" rtl="0" eaLnBrk="1" latinLnBrk="0" hangingPunct="1">
+              <a:lnSpc>
+                <a:spcPct val="90000"/>
+              </a:lnSpc>
+              <a:spcBef>
+                <a:spcPts val="500"/>
+              </a:spcBef>
+              <a:buFont typeface="Arial" panose="020B0604020202020204" pitchFamily="34" charset="0"/>
+              <a:buChar char="•"/>
+              <a:defRPr sz="1800" kern="1200">
+                <a:solidFill>
+                  <a:schemeClr val="tx1"/>
+                </a:solidFill>
+                <a:latin typeface="+mn-lt"/>
+                <a:ea typeface="+mn-ea"/>
+                <a:cs typeface="+mn-cs"/>
+              </a:defRPr>
+            </a:lvl7pPr>
+            <a:lvl8pPr marL="3429000" indent="-228600" algn="l" defTabSz="914400" rtl="0" eaLnBrk="1" latinLnBrk="0" hangingPunct="1">
+              <a:lnSpc>
+                <a:spcPct val="90000"/>
+              </a:lnSpc>
+              <a:spcBef>
+                <a:spcPts val="500"/>
+              </a:spcBef>
+              <a:buFont typeface="Arial" panose="020B0604020202020204" pitchFamily="34" charset="0"/>
+              <a:buChar char="•"/>
+              <a:defRPr sz="1800" kern="1200">
+                <a:solidFill>
+                  <a:schemeClr val="tx1"/>
+                </a:solidFill>
+                <a:latin typeface="+mn-lt"/>
+                <a:ea typeface="+mn-ea"/>
+                <a:cs typeface="+mn-cs"/>
+              </a:defRPr>
+            </a:lvl8pPr>
+            <a:lvl9pPr marL="3886200" indent="-228600" algn="l" defTabSz="914400" rtl="0" eaLnBrk="1" latinLnBrk="0" hangingPunct="1">
+              <a:lnSpc>
+                <a:spcPct val="90000"/>
+              </a:lnSpc>
+              <a:spcBef>
+                <a:spcPts val="500"/>
+              </a:spcBef>
+              <a:buFont typeface="Arial" panose="020B0604020202020204" pitchFamily="34" charset="0"/>
+              <a:buChar char="•"/>
+              <a:defRPr sz="1800" kern="1200">
+                <a:solidFill>
+                  <a:schemeClr val="tx1"/>
+                </a:solidFill>
+                <a:latin typeface="+mn-lt"/>
+                <a:ea typeface="+mn-ea"/>
+                <a:cs typeface="+mn-cs"/>
+              </a:defRPr>
+            </a:lvl9pPr>
+          </a:lstStyle>
+          <a:p>
+            <a:pPr marL="0" indent="0">
+              <a:buNone/>
+            </a:pPr>
+            <a:r>
+              <a:rPr lang="nl-NL" sz="2000" b="1" dirty="0"/>
+              <a:t>Groot aantal splits</a:t>
+            </a:r>
+          </a:p>
+          <a:p>
+            <a:pPr marL="0" indent="0">
+              <a:buNone/>
+            </a:pPr>
+            <a:endParaRPr lang="nl-NL" sz="2000" dirty="0"/>
+          </a:p>
+          <a:p>
+            <a:pPr marL="0" indent="0">
+              <a:buNone/>
+            </a:pPr>
+            <a:r>
+              <a:rPr lang="nl-NL" sz="2000" u="sng" dirty="0"/>
+              <a:t>Grote training sets</a:t>
+            </a:r>
+          </a:p>
+          <a:p>
+            <a:pPr marL="0" indent="0">
+              <a:buNone/>
+            </a:pPr>
+            <a:r>
+              <a:rPr lang="nl-NL" sz="2000" dirty="0"/>
+              <a:t>Model kan beter leren en presteert meer zoals je mag verwachten in de praktijk.</a:t>
+            </a:r>
+          </a:p>
+          <a:p>
+            <a:pPr marL="0" indent="0">
+              <a:buNone/>
+            </a:pPr>
+            <a:endParaRPr lang="nl-NL" sz="2000" dirty="0"/>
+          </a:p>
+          <a:p>
+            <a:pPr marL="0" indent="0">
+              <a:buNone/>
+            </a:pPr>
+            <a:endParaRPr lang="nl-NL" sz="2000" dirty="0"/>
+          </a:p>
+          <a:p>
+            <a:pPr marL="0" indent="0">
+              <a:buNone/>
+            </a:pPr>
+            <a:r>
+              <a:rPr lang="nl-NL" sz="2000" u="sng" dirty="0"/>
+              <a:t>Kleine validatie sets</a:t>
+            </a:r>
+          </a:p>
+          <a:p>
+            <a:pPr marL="0" indent="0">
+              <a:buNone/>
+            </a:pPr>
+            <a:r>
+              <a:rPr lang="nl-NL" sz="2000" dirty="0"/>
+              <a:t>Minder cases</a:t>
+            </a:r>
+            <a:r>
+              <a:rPr lang="nl-NL" sz="2000"/>
+              <a:t>, foutmarges </a:t>
+            </a:r>
+            <a:r>
+              <a:rPr lang="nl-NL" sz="2000" dirty="0"/>
+              <a:t>onnauwkeuriger.</a:t>
+            </a:r>
+          </a:p>
+        </p:txBody>
+      </p:sp>
+      <p:cxnSp>
+        <p:nvCxnSpPr>
+          <p:cNvPr id="8" name="Straight Connector 7">
+            <a:extLst>
+              <a:ext uri="{FF2B5EF4-FFF2-40B4-BE49-F238E27FC236}">
+                <a16:creationId xmlns:a16="http://schemas.microsoft.com/office/drawing/2014/main" id="{13FB5B8E-02A7-4244-A137-A1FF06FED050}"/>
+              </a:ext>
+            </a:extLst>
+          </p:cNvPr>
+          <p:cNvCxnSpPr/>
+          <p:nvPr/>
+        </p:nvCxnSpPr>
+        <p:spPr>
+          <a:xfrm>
+            <a:off x="5805581" y="1531295"/>
+            <a:ext cx="0" cy="4720696"/>
+          </a:xfrm>
+          <a:prstGeom prst="line">
+            <a:avLst/>
+          </a:prstGeom>
+        </p:spPr>
+        <p:style>
+          <a:lnRef idx="2">
+            <a:schemeClr val="dk1"/>
+          </a:lnRef>
+          <a:fillRef idx="0">
+            <a:schemeClr val="dk1"/>
+          </a:fillRef>
+          <a:effectRef idx="1">
+            <a:schemeClr val="dk1"/>
+          </a:effectRef>
+          <a:fontRef idx="minor">
+            <a:schemeClr val="tx1"/>
+          </a:fontRef>
+        </p:style>
+      </p:cxnSp>
     </p:spTree>
     <p:extLst>
       <p:ext uri="{BB962C8B-B14F-4D97-AF65-F5344CB8AC3E}">
-        <p14:creationId xmlns:p14="http://schemas.microsoft.com/office/powerpoint/2010/main" val="3009350591"/>
+        <p14:creationId xmlns:p14="http://schemas.microsoft.com/office/powerpoint/2010/main" val="1093500196"/>
       </p:ext>
     </p:extLst>
   </p:cSld>
@@ -20100,7 +20677,7 @@
             </a:pPr>
             <a:r>
               <a:rPr lang="nl-NL" sz="2000" dirty="0"/>
-              <a:t>Dummy model kan als baseline dienen om prestaties mee te vergelijken.</a:t>
+              <a:t>Dummy model is baseline om prestaties mee te vergelijken.</a:t>
             </a:r>
           </a:p>
         </p:txBody>

</xml_diff>